<commit_message>
On branch main Add metadata slide linking back to article PR. modified:   diagrams/weblogic-on-vms-ha-dr-solution-architecture.pptx
Signed-off-by: Ed Burns <edburns@microsoft.com>
</commit_message>
<xml_diff>
--- a/diagrams/weblogic-on-vms-ha-dr-solution-architecture.pptx
+++ b/diagrams/weblogic-on-vms-ha-dr-solution-architecture.pptx
@@ -5,10 +5,11 @@
     <p:sldMasterId id="2147483648" r:id="rId4"/>
   </p:sldMasterIdLst>
   <p:notesMasterIdLst>
-    <p:notesMasterId r:id="rId6"/>
+    <p:notesMasterId r:id="rId7"/>
   </p:notesMasterIdLst>
   <p:sldIdLst>
     <p:sldId id="262" r:id="rId5"/>
+    <p:sldId id="269" r:id="rId6"/>
   </p:sldIdLst>
   <p:sldSz cx="12192000" cy="6858000"/>
   <p:notesSz cx="6858000" cy="9144000"/>
@@ -118,805 +119,6 @@
 <file path=ppt/changesInfos/changesInfo1.xml><?xml version="1.0" encoding="utf-8"?>
 <pc:chgInfo xmlns:a="http://schemas.openxmlformats.org/drawingml/2006/main" xmlns:r="http://schemas.openxmlformats.org/officeDocument/2006/relationships" xmlns:ac="http://schemas.microsoft.com/office/drawing/2013/main/command" xmlns:pc="http://schemas.microsoft.com/office/powerpoint/2013/main/command">
   <pc:docChgLst>
-    <pc:chgData name="Jianguo Ma" userId="671318c9-574e-4361-a94e-119785a1fc7e" providerId="ADAL" clId="{682E28D5-B08A-4669-877E-54EAA8D1E0B3}"/>
-    <pc:docChg chg="undo redo custSel addSld modSld">
-      <pc:chgData name="Jianguo Ma" userId="671318c9-574e-4361-a94e-119785a1fc7e" providerId="ADAL" clId="{682E28D5-B08A-4669-877E-54EAA8D1E0B3}" dt="2023-12-06T07:41:42.470" v="589" actId="1076"/>
-      <pc:docMkLst>
-        <pc:docMk/>
-      </pc:docMkLst>
-      <pc:sldChg chg="addSp delSp modSp add mod">
-        <pc:chgData name="Jianguo Ma" userId="671318c9-574e-4361-a94e-119785a1fc7e" providerId="ADAL" clId="{682E28D5-B08A-4669-877E-54EAA8D1E0B3}" dt="2023-12-06T07:37:33.588" v="577" actId="478"/>
-        <pc:sldMkLst>
-          <pc:docMk/>
-          <pc:sldMk cId="2776496812" sldId="260"/>
-        </pc:sldMkLst>
-        <pc:spChg chg="del">
-          <ac:chgData name="Jianguo Ma" userId="671318c9-574e-4361-a94e-119785a1fc7e" providerId="ADAL" clId="{682E28D5-B08A-4669-877E-54EAA8D1E0B3}" dt="2023-12-06T05:49:09.202" v="292" actId="478"/>
-          <ac:spMkLst>
-            <pc:docMk/>
-            <pc:sldMk cId="2776496812" sldId="260"/>
-            <ac:spMk id="3" creationId="{581BF304-77F4-9620-EC94-A40FDEB9C681}"/>
-          </ac:spMkLst>
-        </pc:spChg>
-        <pc:spChg chg="mod">
-          <ac:chgData name="Jianguo Ma" userId="671318c9-574e-4361-a94e-119785a1fc7e" providerId="ADAL" clId="{682E28D5-B08A-4669-877E-54EAA8D1E0B3}" dt="2023-12-06T05:50:31.187" v="330" actId="1035"/>
-          <ac:spMkLst>
-            <pc:docMk/>
-            <pc:sldMk cId="2776496812" sldId="260"/>
-            <ac:spMk id="7" creationId="{FE2967D6-6230-4270-9CEA-2A43160BDF69}"/>
-          </ac:spMkLst>
-        </pc:spChg>
-        <pc:spChg chg="mod">
-          <ac:chgData name="Jianguo Ma" userId="671318c9-574e-4361-a94e-119785a1fc7e" providerId="ADAL" clId="{682E28D5-B08A-4669-877E-54EAA8D1E0B3}" dt="2023-12-06T05:50:31.187" v="330" actId="1035"/>
-          <ac:spMkLst>
-            <pc:docMk/>
-            <pc:sldMk cId="2776496812" sldId="260"/>
-            <ac:spMk id="9" creationId="{7116AAD1-72B7-4B73-8122-CF354EDC7966}"/>
-          </ac:spMkLst>
-        </pc:spChg>
-        <pc:spChg chg="mod">
-          <ac:chgData name="Jianguo Ma" userId="671318c9-574e-4361-a94e-119785a1fc7e" providerId="ADAL" clId="{682E28D5-B08A-4669-877E-54EAA8D1E0B3}" dt="2023-12-06T05:50:31.187" v="330" actId="1035"/>
-          <ac:spMkLst>
-            <pc:docMk/>
-            <pc:sldMk cId="2776496812" sldId="260"/>
-            <ac:spMk id="10" creationId="{077EAB8E-8BB4-4715-8D06-D009829FA432}"/>
-          </ac:spMkLst>
-        </pc:spChg>
-        <pc:spChg chg="mod ord">
-          <ac:chgData name="Jianguo Ma" userId="671318c9-574e-4361-a94e-119785a1fc7e" providerId="ADAL" clId="{682E28D5-B08A-4669-877E-54EAA8D1E0B3}" dt="2023-12-06T07:36:37.342" v="573" actId="167"/>
-          <ac:spMkLst>
-            <pc:docMk/>
-            <pc:sldMk cId="2776496812" sldId="260"/>
-            <ac:spMk id="11" creationId="{38D3C87C-6874-4F28-B98B-E0360ED436C8}"/>
-          </ac:spMkLst>
-        </pc:spChg>
-        <pc:spChg chg="add mod">
-          <ac:chgData name="Jianguo Ma" userId="671318c9-574e-4361-a94e-119785a1fc7e" providerId="ADAL" clId="{682E28D5-B08A-4669-877E-54EAA8D1E0B3}" dt="2023-12-06T05:50:31.187" v="330" actId="1035"/>
-          <ac:spMkLst>
-            <pc:docMk/>
-            <pc:sldMk cId="2776496812" sldId="260"/>
-            <ac:spMk id="12" creationId="{35D0E02A-2D7C-48E8-FFE3-0A1DE841768F}"/>
-          </ac:spMkLst>
-        </pc:spChg>
-        <pc:spChg chg="mod">
-          <ac:chgData name="Jianguo Ma" userId="671318c9-574e-4361-a94e-119785a1fc7e" providerId="ADAL" clId="{682E28D5-B08A-4669-877E-54EAA8D1E0B3}" dt="2023-12-06T05:50:31.187" v="330" actId="1035"/>
-          <ac:spMkLst>
-            <pc:docMk/>
-            <pc:sldMk cId="2776496812" sldId="260"/>
-            <ac:spMk id="13" creationId="{CA70E3F9-1016-4B98-B164-D97B86FC226B}"/>
-          </ac:spMkLst>
-        </pc:spChg>
-        <pc:spChg chg="mod">
-          <ac:chgData name="Jianguo Ma" userId="671318c9-574e-4361-a94e-119785a1fc7e" providerId="ADAL" clId="{682E28D5-B08A-4669-877E-54EAA8D1E0B3}" dt="2023-12-06T05:50:31.187" v="330" actId="1035"/>
-          <ac:spMkLst>
-            <pc:docMk/>
-            <pc:sldMk cId="2776496812" sldId="260"/>
-            <ac:spMk id="14" creationId="{E4D91ADC-B721-41C3-B446-4B901835756E}"/>
-          </ac:spMkLst>
-        </pc:spChg>
-        <pc:spChg chg="mod">
-          <ac:chgData name="Jianguo Ma" userId="671318c9-574e-4361-a94e-119785a1fc7e" providerId="ADAL" clId="{682E28D5-B08A-4669-877E-54EAA8D1E0B3}" dt="2023-12-06T05:50:31.187" v="330" actId="1035"/>
-          <ac:spMkLst>
-            <pc:docMk/>
-            <pc:sldMk cId="2776496812" sldId="260"/>
-            <ac:spMk id="20" creationId="{C4EA23F5-E1DC-40A6-9E5D-1FAFD096381F}"/>
-          </ac:spMkLst>
-        </pc:spChg>
-        <pc:spChg chg="mod">
-          <ac:chgData name="Jianguo Ma" userId="671318c9-574e-4361-a94e-119785a1fc7e" providerId="ADAL" clId="{682E28D5-B08A-4669-877E-54EAA8D1E0B3}" dt="2023-12-06T05:51:40.948" v="344" actId="1076"/>
-          <ac:spMkLst>
-            <pc:docMk/>
-            <pc:sldMk cId="2776496812" sldId="260"/>
-            <ac:spMk id="21" creationId="{056FC737-8EA4-AABC-3E0D-4C04272968AE}"/>
-          </ac:spMkLst>
-        </pc:spChg>
-        <pc:spChg chg="mod">
-          <ac:chgData name="Jianguo Ma" userId="671318c9-574e-4361-a94e-119785a1fc7e" providerId="ADAL" clId="{682E28D5-B08A-4669-877E-54EAA8D1E0B3}" dt="2023-12-06T05:50:31.187" v="330" actId="1035"/>
-          <ac:spMkLst>
-            <pc:docMk/>
-            <pc:sldMk cId="2776496812" sldId="260"/>
-            <ac:spMk id="23" creationId="{F1C8F032-F5FD-4021-B7DF-82B4CE75AF20}"/>
-          </ac:spMkLst>
-        </pc:spChg>
-        <pc:spChg chg="mod">
-          <ac:chgData name="Jianguo Ma" userId="671318c9-574e-4361-a94e-119785a1fc7e" providerId="ADAL" clId="{682E28D5-B08A-4669-877E-54EAA8D1E0B3}" dt="2023-12-06T05:52:41.698" v="357" actId="121"/>
-          <ac:spMkLst>
-            <pc:docMk/>
-            <pc:sldMk cId="2776496812" sldId="260"/>
-            <ac:spMk id="24" creationId="{DD36AEE8-718F-0FE4-64BC-F78A2122A2F5}"/>
-          </ac:spMkLst>
-        </pc:spChg>
-        <pc:spChg chg="mod">
-          <ac:chgData name="Jianguo Ma" userId="671318c9-574e-4361-a94e-119785a1fc7e" providerId="ADAL" clId="{682E28D5-B08A-4669-877E-54EAA8D1E0B3}" dt="2023-12-06T05:50:31.187" v="330" actId="1035"/>
-          <ac:spMkLst>
-            <pc:docMk/>
-            <pc:sldMk cId="2776496812" sldId="260"/>
-            <ac:spMk id="25" creationId="{0FDE0696-ABD6-4F86-BE26-44A76F5B4E29}"/>
-          </ac:spMkLst>
-        </pc:spChg>
-        <pc:spChg chg="mod">
-          <ac:chgData name="Jianguo Ma" userId="671318c9-574e-4361-a94e-119785a1fc7e" providerId="ADAL" clId="{682E28D5-B08A-4669-877E-54EAA8D1E0B3}" dt="2023-12-06T05:50:31.187" v="330" actId="1035"/>
-          <ac:spMkLst>
-            <pc:docMk/>
-            <pc:sldMk cId="2776496812" sldId="260"/>
-            <ac:spMk id="26" creationId="{2F95622D-3D09-406D-83D6-8F2BBB82E107}"/>
-          </ac:spMkLst>
-        </pc:spChg>
-        <pc:spChg chg="mod">
-          <ac:chgData name="Jianguo Ma" userId="671318c9-574e-4361-a94e-119785a1fc7e" providerId="ADAL" clId="{682E28D5-B08A-4669-877E-54EAA8D1E0B3}" dt="2023-12-06T05:50:31.187" v="330" actId="1035"/>
-          <ac:spMkLst>
-            <pc:docMk/>
-            <pc:sldMk cId="2776496812" sldId="260"/>
-            <ac:spMk id="28" creationId="{58D01351-EC49-4C01-9A43-5160470C75D7}"/>
-          </ac:spMkLst>
-        </pc:spChg>
-        <pc:spChg chg="add mod">
-          <ac:chgData name="Jianguo Ma" userId="671318c9-574e-4361-a94e-119785a1fc7e" providerId="ADAL" clId="{682E28D5-B08A-4669-877E-54EAA8D1E0B3}" dt="2023-12-06T05:25:22.924" v="152"/>
-          <ac:spMkLst>
-            <pc:docMk/>
-            <pc:sldMk cId="2776496812" sldId="260"/>
-            <ac:spMk id="29" creationId="{3BAABB1A-5B3B-EEC2-4DB0-D130030684A7}"/>
-          </ac:spMkLst>
-        </pc:spChg>
-        <pc:spChg chg="mod">
-          <ac:chgData name="Jianguo Ma" userId="671318c9-574e-4361-a94e-119785a1fc7e" providerId="ADAL" clId="{682E28D5-B08A-4669-877E-54EAA8D1E0B3}" dt="2023-12-06T05:50:31.187" v="330" actId="1035"/>
-          <ac:spMkLst>
-            <pc:docMk/>
-            <pc:sldMk cId="2776496812" sldId="260"/>
-            <ac:spMk id="30" creationId="{B9A5680C-EF73-477D-BD5B-2947E54E378E}"/>
-          </ac:spMkLst>
-        </pc:spChg>
-        <pc:spChg chg="mod">
-          <ac:chgData name="Jianguo Ma" userId="671318c9-574e-4361-a94e-119785a1fc7e" providerId="ADAL" clId="{682E28D5-B08A-4669-877E-54EAA8D1E0B3}" dt="2023-12-06T05:50:31.187" v="330" actId="1035"/>
-          <ac:spMkLst>
-            <pc:docMk/>
-            <pc:sldMk cId="2776496812" sldId="260"/>
-            <ac:spMk id="31" creationId="{10AF9324-55EB-4479-B174-6C49FBA26725}"/>
-          </ac:spMkLst>
-        </pc:spChg>
-        <pc:spChg chg="mod">
-          <ac:chgData name="Jianguo Ma" userId="671318c9-574e-4361-a94e-119785a1fc7e" providerId="ADAL" clId="{682E28D5-B08A-4669-877E-54EAA8D1E0B3}" dt="2023-12-06T05:50:31.187" v="330" actId="1035"/>
-          <ac:spMkLst>
-            <pc:docMk/>
-            <pc:sldMk cId="2776496812" sldId="260"/>
-            <ac:spMk id="32" creationId="{4A8B9EDD-7F3F-4BB0-9EB9-E9D6921F861A}"/>
-          </ac:spMkLst>
-        </pc:spChg>
-        <pc:spChg chg="mod">
-          <ac:chgData name="Jianguo Ma" userId="671318c9-574e-4361-a94e-119785a1fc7e" providerId="ADAL" clId="{682E28D5-B08A-4669-877E-54EAA8D1E0B3}" dt="2023-12-06T05:50:31.187" v="330" actId="1035"/>
-          <ac:spMkLst>
-            <pc:docMk/>
-            <pc:sldMk cId="2776496812" sldId="260"/>
-            <ac:spMk id="33" creationId="{3A6ACD97-6DD5-46CD-8E64-C644269FB80B}"/>
-          </ac:spMkLst>
-        </pc:spChg>
-        <pc:spChg chg="mod">
-          <ac:chgData name="Jianguo Ma" userId="671318c9-574e-4361-a94e-119785a1fc7e" providerId="ADAL" clId="{682E28D5-B08A-4669-877E-54EAA8D1E0B3}" dt="2023-12-06T07:33:36.912" v="513" actId="693"/>
-          <ac:spMkLst>
-            <pc:docMk/>
-            <pc:sldMk cId="2776496812" sldId="260"/>
-            <ac:spMk id="34" creationId="{F01A1ECE-FDC0-4144-AD2C-CDFF7DEDC0AD}"/>
-          </ac:spMkLst>
-        </pc:spChg>
-        <pc:spChg chg="mod">
-          <ac:chgData name="Jianguo Ma" userId="671318c9-574e-4361-a94e-119785a1fc7e" providerId="ADAL" clId="{682E28D5-B08A-4669-877E-54EAA8D1E0B3}" dt="2023-12-06T05:50:31.187" v="330" actId="1035"/>
-          <ac:spMkLst>
-            <pc:docMk/>
-            <pc:sldMk cId="2776496812" sldId="260"/>
-            <ac:spMk id="35" creationId="{805C3CF1-13CC-4A93-9C2F-92CABED48E64}"/>
-          </ac:spMkLst>
-        </pc:spChg>
-        <pc:spChg chg="add mod">
-          <ac:chgData name="Jianguo Ma" userId="671318c9-574e-4361-a94e-119785a1fc7e" providerId="ADAL" clId="{682E28D5-B08A-4669-877E-54EAA8D1E0B3}" dt="2023-12-06T05:26:57.221" v="154"/>
-          <ac:spMkLst>
-            <pc:docMk/>
-            <pc:sldMk cId="2776496812" sldId="260"/>
-            <ac:spMk id="36" creationId="{1DA24D9F-3845-3655-F578-BAEB6C05FA0D}"/>
-          </ac:spMkLst>
-        </pc:spChg>
-        <pc:spChg chg="add del mod">
-          <ac:chgData name="Jianguo Ma" userId="671318c9-574e-4361-a94e-119785a1fc7e" providerId="ADAL" clId="{682E28D5-B08A-4669-877E-54EAA8D1E0B3}" dt="2023-12-06T05:27:04.625" v="156" actId="478"/>
-          <ac:spMkLst>
-            <pc:docMk/>
-            <pc:sldMk cId="2776496812" sldId="260"/>
-            <ac:spMk id="37" creationId="{1DCB38EE-3D8D-BE9D-9414-C225FFD2DC78}"/>
-          </ac:spMkLst>
-        </pc:spChg>
-        <pc:spChg chg="add del mod">
-          <ac:chgData name="Jianguo Ma" userId="671318c9-574e-4361-a94e-119785a1fc7e" providerId="ADAL" clId="{682E28D5-B08A-4669-877E-54EAA8D1E0B3}" dt="2023-12-06T07:34:04.672" v="515" actId="478"/>
-          <ac:spMkLst>
-            <pc:docMk/>
-            <pc:sldMk cId="2776496812" sldId="260"/>
-            <ac:spMk id="38" creationId="{986ED25A-7598-390F-C421-961CD05AC6A0}"/>
-          </ac:spMkLst>
-        </pc:spChg>
-        <pc:spChg chg="mod">
-          <ac:chgData name="Jianguo Ma" userId="671318c9-574e-4361-a94e-119785a1fc7e" providerId="ADAL" clId="{682E28D5-B08A-4669-877E-54EAA8D1E0B3}" dt="2023-12-06T07:35:08.355" v="527" actId="14100"/>
-          <ac:spMkLst>
-            <pc:docMk/>
-            <pc:sldMk cId="2776496812" sldId="260"/>
-            <ac:spMk id="39" creationId="{BE25E3EB-4222-4437-9F8D-9D3C02473B66}"/>
-          </ac:spMkLst>
-        </pc:spChg>
-        <pc:spChg chg="del">
-          <ac:chgData name="Jianguo Ma" userId="671318c9-574e-4361-a94e-119785a1fc7e" providerId="ADAL" clId="{682E28D5-B08A-4669-877E-54EAA8D1E0B3}" dt="2023-12-06T05:49:05.235" v="290" actId="478"/>
-          <ac:spMkLst>
-            <pc:docMk/>
-            <pc:sldMk cId="2776496812" sldId="260"/>
-            <ac:spMk id="40" creationId="{7F66BE93-76AC-4FC0-9D8F-11DCD30D294E}"/>
-          </ac:spMkLst>
-        </pc:spChg>
-        <pc:spChg chg="mod">
-          <ac:chgData name="Jianguo Ma" userId="671318c9-574e-4361-a94e-119785a1fc7e" providerId="ADAL" clId="{682E28D5-B08A-4669-877E-54EAA8D1E0B3}" dt="2023-12-06T05:50:31.187" v="330" actId="1035"/>
-          <ac:spMkLst>
-            <pc:docMk/>
-            <pc:sldMk cId="2776496812" sldId="260"/>
-            <ac:spMk id="42" creationId="{502149A4-05F7-464F-83EE-836F82338573}"/>
-          </ac:spMkLst>
-        </pc:spChg>
-        <pc:spChg chg="mod ord">
-          <ac:chgData name="Jianguo Ma" userId="671318c9-574e-4361-a94e-119785a1fc7e" providerId="ADAL" clId="{682E28D5-B08A-4669-877E-54EAA8D1E0B3}" dt="2023-12-06T07:36:44.096" v="574" actId="167"/>
-          <ac:spMkLst>
-            <pc:docMk/>
-            <pc:sldMk cId="2776496812" sldId="260"/>
-            <ac:spMk id="43" creationId="{11960A80-4EE0-49FD-91B2-99BD128F94DA}"/>
-          </ac:spMkLst>
-        </pc:spChg>
-        <pc:spChg chg="mod">
-          <ac:chgData name="Jianguo Ma" userId="671318c9-574e-4361-a94e-119785a1fc7e" providerId="ADAL" clId="{682E28D5-B08A-4669-877E-54EAA8D1E0B3}" dt="2023-12-06T05:50:31.187" v="330" actId="1035"/>
-          <ac:spMkLst>
-            <pc:docMk/>
-            <pc:sldMk cId="2776496812" sldId="260"/>
-            <ac:spMk id="45" creationId="{000902AE-AFEC-4285-ABCC-B2F98BF0C5AB}"/>
-          </ac:spMkLst>
-        </pc:spChg>
-        <pc:spChg chg="mod">
-          <ac:chgData name="Jianguo Ma" userId="671318c9-574e-4361-a94e-119785a1fc7e" providerId="ADAL" clId="{682E28D5-B08A-4669-877E-54EAA8D1E0B3}" dt="2023-12-06T05:50:31.187" v="330" actId="1035"/>
-          <ac:spMkLst>
-            <pc:docMk/>
-            <pc:sldMk cId="2776496812" sldId="260"/>
-            <ac:spMk id="47" creationId="{6C290BE5-0A50-408F-9836-5B7A0A1DEF26}"/>
-          </ac:spMkLst>
-        </pc:spChg>
-        <pc:spChg chg="mod">
-          <ac:chgData name="Jianguo Ma" userId="671318c9-574e-4361-a94e-119785a1fc7e" providerId="ADAL" clId="{682E28D5-B08A-4669-877E-54EAA8D1E0B3}" dt="2023-12-06T05:50:31.187" v="330" actId="1035"/>
-          <ac:spMkLst>
-            <pc:docMk/>
-            <pc:sldMk cId="2776496812" sldId="260"/>
-            <ac:spMk id="50" creationId="{8F799904-F670-4031-A87B-1FDC8994D3EA}"/>
-          </ac:spMkLst>
-        </pc:spChg>
-        <pc:spChg chg="mod">
-          <ac:chgData name="Jianguo Ma" userId="671318c9-574e-4361-a94e-119785a1fc7e" providerId="ADAL" clId="{682E28D5-B08A-4669-877E-54EAA8D1E0B3}" dt="2023-12-06T05:50:31.187" v="330" actId="1035"/>
-          <ac:spMkLst>
-            <pc:docMk/>
-            <pc:sldMk cId="2776496812" sldId="260"/>
-            <ac:spMk id="52" creationId="{9D0B91F7-1D33-43A1-9807-FCBB882AD6F2}"/>
-          </ac:spMkLst>
-        </pc:spChg>
-        <pc:spChg chg="mod">
-          <ac:chgData name="Jianguo Ma" userId="671318c9-574e-4361-a94e-119785a1fc7e" providerId="ADAL" clId="{682E28D5-B08A-4669-877E-54EAA8D1E0B3}" dt="2023-12-06T05:50:31.187" v="330" actId="1035"/>
-          <ac:spMkLst>
-            <pc:docMk/>
-            <pc:sldMk cId="2776496812" sldId="260"/>
-            <ac:spMk id="53" creationId="{207F28D3-8FB7-4827-B8AB-1A97828DE312}"/>
-          </ac:spMkLst>
-        </pc:spChg>
-        <pc:spChg chg="mod">
-          <ac:chgData name="Jianguo Ma" userId="671318c9-574e-4361-a94e-119785a1fc7e" providerId="ADAL" clId="{682E28D5-B08A-4669-877E-54EAA8D1E0B3}" dt="2023-12-06T05:50:31.187" v="330" actId="1035"/>
-          <ac:spMkLst>
-            <pc:docMk/>
-            <pc:sldMk cId="2776496812" sldId="260"/>
-            <ac:spMk id="55" creationId="{4DBF1B48-8D40-4F00-BBBA-A24F2E7D4D20}"/>
-          </ac:spMkLst>
-        </pc:spChg>
-        <pc:spChg chg="add mod">
-          <ac:chgData name="Jianguo Ma" userId="671318c9-574e-4361-a94e-119785a1fc7e" providerId="ADAL" clId="{682E28D5-B08A-4669-877E-54EAA8D1E0B3}" dt="2023-12-06T07:36:15.563" v="571" actId="1037"/>
-          <ac:spMkLst>
-            <pc:docMk/>
-            <pc:sldMk cId="2776496812" sldId="260"/>
-            <ac:spMk id="56" creationId="{351A2E18-4198-08E8-6BBB-5662CE36083B}"/>
-          </ac:spMkLst>
-        </pc:spChg>
-        <pc:spChg chg="mod">
-          <ac:chgData name="Jianguo Ma" userId="671318c9-574e-4361-a94e-119785a1fc7e" providerId="ADAL" clId="{682E28D5-B08A-4669-877E-54EAA8D1E0B3}" dt="2023-12-06T05:50:31.187" v="330" actId="1035"/>
-          <ac:spMkLst>
-            <pc:docMk/>
-            <pc:sldMk cId="2776496812" sldId="260"/>
-            <ac:spMk id="57" creationId="{63C585E9-D7C1-4651-BA19-08FBAD44D502}"/>
-          </ac:spMkLst>
-        </pc:spChg>
-        <pc:spChg chg="mod">
-          <ac:chgData name="Jianguo Ma" userId="671318c9-574e-4361-a94e-119785a1fc7e" providerId="ADAL" clId="{682E28D5-B08A-4669-877E-54EAA8D1E0B3}" dt="2023-12-06T05:50:31.187" v="330" actId="1035"/>
-          <ac:spMkLst>
-            <pc:docMk/>
-            <pc:sldMk cId="2776496812" sldId="260"/>
-            <ac:spMk id="58" creationId="{585745E3-E781-43FF-9D9F-A78829559707}"/>
-          </ac:spMkLst>
-        </pc:spChg>
-        <pc:spChg chg="mod">
-          <ac:chgData name="Jianguo Ma" userId="671318c9-574e-4361-a94e-119785a1fc7e" providerId="ADAL" clId="{682E28D5-B08A-4669-877E-54EAA8D1E0B3}" dt="2023-12-06T05:50:31.187" v="330" actId="1035"/>
-          <ac:spMkLst>
-            <pc:docMk/>
-            <pc:sldMk cId="2776496812" sldId="260"/>
-            <ac:spMk id="59" creationId="{15699379-F6B0-4F29-9F76-FFE3D4B97F53}"/>
-          </ac:spMkLst>
-        </pc:spChg>
-        <pc:spChg chg="mod">
-          <ac:chgData name="Jianguo Ma" userId="671318c9-574e-4361-a94e-119785a1fc7e" providerId="ADAL" clId="{682E28D5-B08A-4669-877E-54EAA8D1E0B3}" dt="2023-12-06T05:50:31.187" v="330" actId="1035"/>
-          <ac:spMkLst>
-            <pc:docMk/>
-            <pc:sldMk cId="2776496812" sldId="260"/>
-            <ac:spMk id="60" creationId="{9CD25FBB-4444-4401-9CCD-DC877BC2FCBD}"/>
-          </ac:spMkLst>
-        </pc:spChg>
-        <pc:spChg chg="mod">
-          <ac:chgData name="Jianguo Ma" userId="671318c9-574e-4361-a94e-119785a1fc7e" providerId="ADAL" clId="{682E28D5-B08A-4669-877E-54EAA8D1E0B3}" dt="2023-12-06T07:33:48.788" v="514" actId="693"/>
-          <ac:spMkLst>
-            <pc:docMk/>
-            <pc:sldMk cId="2776496812" sldId="260"/>
-            <ac:spMk id="61" creationId="{87EB5FA6-CC6F-4B00-8C5C-FBB43E6BEC18}"/>
-          </ac:spMkLst>
-        </pc:spChg>
-        <pc:spChg chg="mod">
-          <ac:chgData name="Jianguo Ma" userId="671318c9-574e-4361-a94e-119785a1fc7e" providerId="ADAL" clId="{682E28D5-B08A-4669-877E-54EAA8D1E0B3}" dt="2023-12-06T05:50:31.187" v="330" actId="1035"/>
-          <ac:spMkLst>
-            <pc:docMk/>
-            <pc:sldMk cId="2776496812" sldId="260"/>
-            <ac:spMk id="62" creationId="{9C943479-F0C5-49F1-B220-629A4D947433}"/>
-          </ac:spMkLst>
-        </pc:spChg>
-        <pc:spChg chg="add del mod">
-          <ac:chgData name="Jianguo Ma" userId="671318c9-574e-4361-a94e-119785a1fc7e" providerId="ADAL" clId="{682E28D5-B08A-4669-877E-54EAA8D1E0B3}" dt="2023-12-06T07:34:27.478" v="520" actId="478"/>
-          <ac:spMkLst>
-            <pc:docMk/>
-            <pc:sldMk cId="2776496812" sldId="260"/>
-            <ac:spMk id="63" creationId="{119E2846-F37A-D035-A438-1A23921618CA}"/>
-          </ac:spMkLst>
-        </pc:spChg>
-        <pc:spChg chg="add del mod">
-          <ac:chgData name="Jianguo Ma" userId="671318c9-574e-4361-a94e-119785a1fc7e" providerId="ADAL" clId="{682E28D5-B08A-4669-877E-54EAA8D1E0B3}" dt="2023-12-06T06:02:00.173" v="483" actId="478"/>
-          <ac:spMkLst>
-            <pc:docMk/>
-            <pc:sldMk cId="2776496812" sldId="260"/>
-            <ac:spMk id="64" creationId="{A988CE28-204A-B793-2BB9-D08CCC352EEB}"/>
-          </ac:spMkLst>
-        </pc:spChg>
-        <pc:spChg chg="add mod">
-          <ac:chgData name="Jianguo Ma" userId="671318c9-574e-4361-a94e-119785a1fc7e" providerId="ADAL" clId="{682E28D5-B08A-4669-877E-54EAA8D1E0B3}" dt="2023-12-06T06:01:21.750" v="477" actId="1076"/>
-          <ac:spMkLst>
-            <pc:docMk/>
-            <pc:sldMk cId="2776496812" sldId="260"/>
-            <ac:spMk id="65" creationId="{BC29EF3B-99DA-8BF2-1533-88F8A367DC8A}"/>
-          </ac:spMkLst>
-        </pc:spChg>
-        <pc:spChg chg="mod">
-          <ac:chgData name="Jianguo Ma" userId="671318c9-574e-4361-a94e-119785a1fc7e" providerId="ADAL" clId="{682E28D5-B08A-4669-877E-54EAA8D1E0B3}" dt="2023-12-06T07:35:03.952" v="526" actId="14100"/>
-          <ac:spMkLst>
-            <pc:docMk/>
-            <pc:sldMk cId="2776496812" sldId="260"/>
-            <ac:spMk id="66" creationId="{E7103754-7C9D-46CD-A6DE-0B695BD86519}"/>
-          </ac:spMkLst>
-        </pc:spChg>
-        <pc:spChg chg="add del mod">
-          <ac:chgData name="Jianguo Ma" userId="671318c9-574e-4361-a94e-119785a1fc7e" providerId="ADAL" clId="{682E28D5-B08A-4669-877E-54EAA8D1E0B3}" dt="2023-12-06T05:58:58.145" v="449" actId="1076"/>
-          <ac:spMkLst>
-            <pc:docMk/>
-            <pc:sldMk cId="2776496812" sldId="260"/>
-            <ac:spMk id="67" creationId="{E88326E1-91F3-8DEE-6927-A621848DD81D}"/>
-          </ac:spMkLst>
-        </pc:spChg>
-        <pc:spChg chg="mod">
-          <ac:chgData name="Jianguo Ma" userId="671318c9-574e-4361-a94e-119785a1fc7e" providerId="ADAL" clId="{682E28D5-B08A-4669-877E-54EAA8D1E0B3}" dt="2023-12-06T05:50:31.187" v="330" actId="1035"/>
-          <ac:spMkLst>
-            <pc:docMk/>
-            <pc:sldMk cId="2776496812" sldId="260"/>
-            <ac:spMk id="69" creationId="{138CD46C-A2FF-43BF-8CBE-2408755A92DE}"/>
-          </ac:spMkLst>
-        </pc:spChg>
-        <pc:spChg chg="mod">
-          <ac:chgData name="Jianguo Ma" userId="671318c9-574e-4361-a94e-119785a1fc7e" providerId="ADAL" clId="{682E28D5-B08A-4669-877E-54EAA8D1E0B3}" dt="2023-12-06T05:50:31.187" v="330" actId="1035"/>
-          <ac:spMkLst>
-            <pc:docMk/>
-            <pc:sldMk cId="2776496812" sldId="260"/>
-            <ac:spMk id="70" creationId="{6453911D-E2A8-4EA5-9039-E048985FBB4A}"/>
-          </ac:spMkLst>
-        </pc:spChg>
-        <pc:spChg chg="mod">
-          <ac:chgData name="Jianguo Ma" userId="671318c9-574e-4361-a94e-119785a1fc7e" providerId="ADAL" clId="{682E28D5-B08A-4669-877E-54EAA8D1E0B3}" dt="2023-12-06T05:50:40.975" v="331" actId="14100"/>
-          <ac:spMkLst>
-            <pc:docMk/>
-            <pc:sldMk cId="2776496812" sldId="260"/>
-            <ac:spMk id="71" creationId="{D3B070FF-CF82-534A-B972-C6C9E4140726}"/>
-          </ac:spMkLst>
-        </pc:spChg>
-        <pc:spChg chg="del">
-          <ac:chgData name="Jianguo Ma" userId="671318c9-574e-4361-a94e-119785a1fc7e" providerId="ADAL" clId="{682E28D5-B08A-4669-877E-54EAA8D1E0B3}" dt="2023-12-06T05:49:11.301" v="293" actId="478"/>
-          <ac:spMkLst>
-            <pc:docMk/>
-            <pc:sldMk cId="2776496812" sldId="260"/>
-            <ac:spMk id="72" creationId="{2C946B3C-90FD-4D7B-9686-6F49BAC0FB05}"/>
-          </ac:spMkLst>
-        </pc:spChg>
-        <pc:spChg chg="add mod">
-          <ac:chgData name="Jianguo Ma" userId="671318c9-574e-4361-a94e-119785a1fc7e" providerId="ADAL" clId="{682E28D5-B08A-4669-877E-54EAA8D1E0B3}" dt="2023-12-06T07:34:25.704" v="519" actId="14100"/>
-          <ac:spMkLst>
-            <pc:docMk/>
-            <pc:sldMk cId="2776496812" sldId="260"/>
-            <ac:spMk id="79" creationId="{121D6AD4-F919-FBDF-BAE5-4CBEC6A69BA2}"/>
-          </ac:spMkLst>
-        </pc:spChg>
-        <pc:spChg chg="add mod ord">
-          <ac:chgData name="Jianguo Ma" userId="671318c9-574e-4361-a94e-119785a1fc7e" providerId="ADAL" clId="{682E28D5-B08A-4669-877E-54EAA8D1E0B3}" dt="2023-12-06T07:37:06.388" v="576" actId="14100"/>
-          <ac:spMkLst>
-            <pc:docMk/>
-            <pc:sldMk cId="2776496812" sldId="260"/>
-            <ac:spMk id="81" creationId="{16C6716B-DBF9-4E05-728E-3EA2CEA5A63B}"/>
-          </ac:spMkLst>
-        </pc:spChg>
-        <pc:spChg chg="del mod">
-          <ac:chgData name="Jianguo Ma" userId="671318c9-574e-4361-a94e-119785a1fc7e" providerId="ADAL" clId="{682E28D5-B08A-4669-877E-54EAA8D1E0B3}" dt="2023-12-06T07:37:33.588" v="577" actId="478"/>
-          <ac:spMkLst>
-            <pc:docMk/>
-            <pc:sldMk cId="2776496812" sldId="260"/>
-            <ac:spMk id="88" creationId="{B28D1FEF-C276-4469-8690-E4CBFCFE7451}"/>
-          </ac:spMkLst>
-        </pc:spChg>
-        <pc:picChg chg="mod">
-          <ac:chgData name="Jianguo Ma" userId="671318c9-574e-4361-a94e-119785a1fc7e" providerId="ADAL" clId="{682E28D5-B08A-4669-877E-54EAA8D1E0B3}" dt="2023-12-06T05:50:31.187" v="330" actId="1035"/>
-          <ac:picMkLst>
-            <pc:docMk/>
-            <pc:sldMk cId="2776496812" sldId="260"/>
-            <ac:picMk id="2" creationId="{E85E2877-C527-2241-957B-07005A9AB8EE}"/>
-          </ac:picMkLst>
-        </pc:picChg>
-        <pc:picChg chg="mod">
-          <ac:chgData name="Jianguo Ma" userId="671318c9-574e-4361-a94e-119785a1fc7e" providerId="ADAL" clId="{682E28D5-B08A-4669-877E-54EAA8D1E0B3}" dt="2023-12-06T05:50:31.187" v="330" actId="1035"/>
-          <ac:picMkLst>
-            <pc:docMk/>
-            <pc:sldMk cId="2776496812" sldId="260"/>
-            <ac:picMk id="4" creationId="{19D6F7ED-2644-4847-ADD0-9DC9EC58301D}"/>
-          </ac:picMkLst>
-        </pc:picChg>
-        <pc:picChg chg="del">
-          <ac:chgData name="Jianguo Ma" userId="671318c9-574e-4361-a94e-119785a1fc7e" providerId="ADAL" clId="{682E28D5-B08A-4669-877E-54EAA8D1E0B3}" dt="2023-12-06T05:24:59.505" v="146" actId="478"/>
-          <ac:picMkLst>
-            <pc:docMk/>
-            <pc:sldMk cId="2776496812" sldId="260"/>
-            <ac:picMk id="5" creationId="{84BF03D3-4482-A33C-1A1A-29FBF0EB6E33}"/>
-          </ac:picMkLst>
-        </pc:picChg>
-        <pc:picChg chg="mod">
-          <ac:chgData name="Jianguo Ma" userId="671318c9-574e-4361-a94e-119785a1fc7e" providerId="ADAL" clId="{682E28D5-B08A-4669-877E-54EAA8D1E0B3}" dt="2023-12-06T05:50:31.187" v="330" actId="1035"/>
-          <ac:picMkLst>
-            <pc:docMk/>
-            <pc:sldMk cId="2776496812" sldId="260"/>
-            <ac:picMk id="6" creationId="{C6B146D0-8D56-4769-9D4B-AC46330D95CB}"/>
-          </ac:picMkLst>
-        </pc:picChg>
-        <pc:picChg chg="mod">
-          <ac:chgData name="Jianguo Ma" userId="671318c9-574e-4361-a94e-119785a1fc7e" providerId="ADAL" clId="{682E28D5-B08A-4669-877E-54EAA8D1E0B3}" dt="2023-12-06T05:50:31.187" v="330" actId="1035"/>
-          <ac:picMkLst>
-            <pc:docMk/>
-            <pc:sldMk cId="2776496812" sldId="260"/>
-            <ac:picMk id="8" creationId="{C2DFB634-10C8-4581-931F-0034F190ADE4}"/>
-          </ac:picMkLst>
-        </pc:picChg>
-        <pc:picChg chg="del">
-          <ac:chgData name="Jianguo Ma" userId="671318c9-574e-4361-a94e-119785a1fc7e" providerId="ADAL" clId="{682E28D5-B08A-4669-877E-54EAA8D1E0B3}" dt="2023-12-06T05:25:01.470" v="147" actId="478"/>
-          <ac:picMkLst>
-            <pc:docMk/>
-            <pc:sldMk cId="2776496812" sldId="260"/>
-            <ac:picMk id="15" creationId="{E400EAC8-6B2C-8271-B63A-934E8F1465AE}"/>
-          </ac:picMkLst>
-        </pc:picChg>
-        <pc:picChg chg="mod">
-          <ac:chgData name="Jianguo Ma" userId="671318c9-574e-4361-a94e-119785a1fc7e" providerId="ADAL" clId="{682E28D5-B08A-4669-877E-54EAA8D1E0B3}" dt="2023-12-06T05:50:31.187" v="330" actId="1035"/>
-          <ac:picMkLst>
-            <pc:docMk/>
-            <pc:sldMk cId="2776496812" sldId="260"/>
-            <ac:picMk id="16" creationId="{D6AD0288-352A-4CFF-9E1E-7363BE84B6A3}"/>
-          </ac:picMkLst>
-        </pc:picChg>
-        <pc:picChg chg="mod">
-          <ac:chgData name="Jianguo Ma" userId="671318c9-574e-4361-a94e-119785a1fc7e" providerId="ADAL" clId="{682E28D5-B08A-4669-877E-54EAA8D1E0B3}" dt="2023-12-06T05:50:31.187" v="330" actId="1035"/>
-          <ac:picMkLst>
-            <pc:docMk/>
-            <pc:sldMk cId="2776496812" sldId="260"/>
-            <ac:picMk id="17" creationId="{FD7156D7-C7DE-4D23-B2FB-A07B59E223BB}"/>
-          </ac:picMkLst>
-        </pc:picChg>
-        <pc:picChg chg="mod">
-          <ac:chgData name="Jianguo Ma" userId="671318c9-574e-4361-a94e-119785a1fc7e" providerId="ADAL" clId="{682E28D5-B08A-4669-877E-54EAA8D1E0B3}" dt="2023-12-06T05:50:31.187" v="330" actId="1035"/>
-          <ac:picMkLst>
-            <pc:docMk/>
-            <pc:sldMk cId="2776496812" sldId="260"/>
-            <ac:picMk id="18" creationId="{FEC68F59-AF3B-4B8C-A6BC-F41FB6A798AC}"/>
-          </ac:picMkLst>
-        </pc:picChg>
-        <pc:picChg chg="mod">
-          <ac:chgData name="Jianguo Ma" userId="671318c9-574e-4361-a94e-119785a1fc7e" providerId="ADAL" clId="{682E28D5-B08A-4669-877E-54EAA8D1E0B3}" dt="2023-12-06T05:50:31.187" v="330" actId="1035"/>
-          <ac:picMkLst>
-            <pc:docMk/>
-            <pc:sldMk cId="2776496812" sldId="260"/>
-            <ac:picMk id="19" creationId="{9A9D1631-9FB4-456F-ADAD-2E4B5A3BA9F2}"/>
-          </ac:picMkLst>
-        </pc:picChg>
-        <pc:picChg chg="mod">
-          <ac:chgData name="Jianguo Ma" userId="671318c9-574e-4361-a94e-119785a1fc7e" providerId="ADAL" clId="{682E28D5-B08A-4669-877E-54EAA8D1E0B3}" dt="2023-12-06T05:50:31.187" v="330" actId="1035"/>
-          <ac:picMkLst>
-            <pc:docMk/>
-            <pc:sldMk cId="2776496812" sldId="260"/>
-            <ac:picMk id="22" creationId="{C8E47A49-114D-477D-9D6A-E9C7B018BA70}"/>
-          </ac:picMkLst>
-        </pc:picChg>
-        <pc:picChg chg="mod">
-          <ac:chgData name="Jianguo Ma" userId="671318c9-574e-4361-a94e-119785a1fc7e" providerId="ADAL" clId="{682E28D5-B08A-4669-877E-54EAA8D1E0B3}" dt="2023-12-06T05:50:31.187" v="330" actId="1035"/>
-          <ac:picMkLst>
-            <pc:docMk/>
-            <pc:sldMk cId="2776496812" sldId="260"/>
-            <ac:picMk id="27" creationId="{12C6F54D-3132-4766-895D-9467313FD940}"/>
-          </ac:picMkLst>
-        </pc:picChg>
-        <pc:picChg chg="add del mod">
-          <ac:chgData name="Jianguo Ma" userId="671318c9-574e-4361-a94e-119785a1fc7e" providerId="ADAL" clId="{682E28D5-B08A-4669-877E-54EAA8D1E0B3}" dt="2023-12-06T07:31:53.019" v="503" actId="478"/>
-          <ac:picMkLst>
-            <pc:docMk/>
-            <pc:sldMk cId="2776496812" sldId="260"/>
-            <ac:picMk id="41" creationId="{D9F5186E-CCE0-B5CC-D3E9-65B64B82452E}"/>
-          </ac:picMkLst>
-        </pc:picChg>
-        <pc:picChg chg="mod">
-          <ac:chgData name="Jianguo Ma" userId="671318c9-574e-4361-a94e-119785a1fc7e" providerId="ADAL" clId="{682E28D5-B08A-4669-877E-54EAA8D1E0B3}" dt="2023-12-06T05:50:31.187" v="330" actId="1035"/>
-          <ac:picMkLst>
-            <pc:docMk/>
-            <pc:sldMk cId="2776496812" sldId="260"/>
-            <ac:picMk id="44" creationId="{BE531519-3C31-4D37-A28B-D4661EEE3086}"/>
-          </ac:picMkLst>
-        </pc:picChg>
-        <pc:picChg chg="mod">
-          <ac:chgData name="Jianguo Ma" userId="671318c9-574e-4361-a94e-119785a1fc7e" providerId="ADAL" clId="{682E28D5-B08A-4669-877E-54EAA8D1E0B3}" dt="2023-12-06T05:50:31.187" v="330" actId="1035"/>
-          <ac:picMkLst>
-            <pc:docMk/>
-            <pc:sldMk cId="2776496812" sldId="260"/>
-            <ac:picMk id="46" creationId="{4B9C6593-0AC3-4D49-ACA2-22B420F62B66}"/>
-          </ac:picMkLst>
-        </pc:picChg>
-        <pc:picChg chg="add del mod">
-          <ac:chgData name="Jianguo Ma" userId="671318c9-574e-4361-a94e-119785a1fc7e" providerId="ADAL" clId="{682E28D5-B08A-4669-877E-54EAA8D1E0B3}" dt="2023-12-06T07:32:02.277" v="508" actId="478"/>
-          <ac:picMkLst>
-            <pc:docMk/>
-            <pc:sldMk cId="2776496812" sldId="260"/>
-            <ac:picMk id="48" creationId="{6EE72F1F-B754-B77E-08EA-CA417AD8AF8D}"/>
-          </ac:picMkLst>
-        </pc:picChg>
-        <pc:picChg chg="mod">
-          <ac:chgData name="Jianguo Ma" userId="671318c9-574e-4361-a94e-119785a1fc7e" providerId="ADAL" clId="{682E28D5-B08A-4669-877E-54EAA8D1E0B3}" dt="2023-12-06T05:50:31.187" v="330" actId="1035"/>
-          <ac:picMkLst>
-            <pc:docMk/>
-            <pc:sldMk cId="2776496812" sldId="260"/>
-            <ac:picMk id="49" creationId="{B30CCCAF-3E77-4C52-B202-D6B50B084339}"/>
-          </ac:picMkLst>
-        </pc:picChg>
-        <pc:picChg chg="mod">
-          <ac:chgData name="Jianguo Ma" userId="671318c9-574e-4361-a94e-119785a1fc7e" providerId="ADAL" clId="{682E28D5-B08A-4669-877E-54EAA8D1E0B3}" dt="2023-12-06T05:50:31.187" v="330" actId="1035"/>
-          <ac:picMkLst>
-            <pc:docMk/>
-            <pc:sldMk cId="2776496812" sldId="260"/>
-            <ac:picMk id="54" creationId="{907AEB1B-C13B-4B87-BC55-28FB749CD8FA}"/>
-          </ac:picMkLst>
-        </pc:picChg>
-        <pc:picChg chg="mod">
-          <ac:chgData name="Jianguo Ma" userId="671318c9-574e-4361-a94e-119785a1fc7e" providerId="ADAL" clId="{682E28D5-B08A-4669-877E-54EAA8D1E0B3}" dt="2023-12-06T05:50:31.187" v="330" actId="1035"/>
-          <ac:picMkLst>
-            <pc:docMk/>
-            <pc:sldMk cId="2776496812" sldId="260"/>
-            <ac:picMk id="74" creationId="{387F6FAA-286E-0341-9C0D-518213813B02}"/>
-          </ac:picMkLst>
-        </pc:picChg>
-        <pc:picChg chg="add mod">
-          <ac:chgData name="Jianguo Ma" userId="671318c9-574e-4361-a94e-119785a1fc7e" providerId="ADAL" clId="{682E28D5-B08A-4669-877E-54EAA8D1E0B3}" dt="2023-12-06T07:32:00.254" v="507" actId="14100"/>
-          <ac:picMkLst>
-            <pc:docMk/>
-            <pc:sldMk cId="2776496812" sldId="260"/>
-            <ac:picMk id="77" creationId="{5F2744A9-82F0-61EE-1F44-A12A9C251CAB}"/>
-          </ac:picMkLst>
-        </pc:picChg>
-        <pc:picChg chg="add mod">
-          <ac:chgData name="Jianguo Ma" userId="671318c9-574e-4361-a94e-119785a1fc7e" providerId="ADAL" clId="{682E28D5-B08A-4669-877E-54EAA8D1E0B3}" dt="2023-12-06T07:32:07.553" v="510" actId="1076"/>
-          <ac:picMkLst>
-            <pc:docMk/>
-            <pc:sldMk cId="2776496812" sldId="260"/>
-            <ac:picMk id="78" creationId="{6983C2ED-8B3B-9205-C743-A47288D0199E}"/>
-          </ac:picMkLst>
-        </pc:picChg>
-        <pc:picChg chg="mod">
-          <ac:chgData name="Jianguo Ma" userId="671318c9-574e-4361-a94e-119785a1fc7e" providerId="ADAL" clId="{682E28D5-B08A-4669-877E-54EAA8D1E0B3}" dt="2023-12-06T05:50:31.187" v="330" actId="1035"/>
-          <ac:picMkLst>
-            <pc:docMk/>
-            <pc:sldMk cId="2776496812" sldId="260"/>
-            <ac:picMk id="80" creationId="{B15523FD-16E4-44BC-ACE9-7D50F7412726}"/>
-          </ac:picMkLst>
-        </pc:picChg>
-        <pc:picChg chg="mod">
-          <ac:chgData name="Jianguo Ma" userId="671318c9-574e-4361-a94e-119785a1fc7e" providerId="ADAL" clId="{682E28D5-B08A-4669-877E-54EAA8D1E0B3}" dt="2023-12-06T05:50:31.187" v="330" actId="1035"/>
-          <ac:picMkLst>
-            <pc:docMk/>
-            <pc:sldMk cId="2776496812" sldId="260"/>
-            <ac:picMk id="82" creationId="{5BCE80F0-668B-4D4C-AC9D-F876DC5DB0D8}"/>
-          </ac:picMkLst>
-        </pc:picChg>
-        <pc:picChg chg="mod">
-          <ac:chgData name="Jianguo Ma" userId="671318c9-574e-4361-a94e-119785a1fc7e" providerId="ADAL" clId="{682E28D5-B08A-4669-877E-54EAA8D1E0B3}" dt="2023-12-06T05:50:31.187" v="330" actId="1035"/>
-          <ac:picMkLst>
-            <pc:docMk/>
-            <pc:sldMk cId="2776496812" sldId="260"/>
-            <ac:picMk id="84" creationId="{76CAEF40-FCB6-4ACF-A411-A46D93C56675}"/>
-          </ac:picMkLst>
-        </pc:picChg>
-        <pc:picChg chg="mod">
-          <ac:chgData name="Jianguo Ma" userId="671318c9-574e-4361-a94e-119785a1fc7e" providerId="ADAL" clId="{682E28D5-B08A-4669-877E-54EAA8D1E0B3}" dt="2023-12-06T05:50:31.187" v="330" actId="1035"/>
-          <ac:picMkLst>
-            <pc:docMk/>
-            <pc:sldMk cId="2776496812" sldId="260"/>
-            <ac:picMk id="1026" creationId="{379B589A-2621-473B-87D0-3CE1DCF1D5FB}"/>
-          </ac:picMkLst>
-        </pc:picChg>
-        <pc:cxnChg chg="add del mod">
-          <ac:chgData name="Jianguo Ma" userId="671318c9-574e-4361-a94e-119785a1fc7e" providerId="ADAL" clId="{682E28D5-B08A-4669-877E-54EAA8D1E0B3}" dt="2023-12-06T06:01:27.077" v="479" actId="1076"/>
-          <ac:cxnSpMkLst>
-            <pc:docMk/>
-            <pc:sldMk cId="2776496812" sldId="260"/>
-            <ac:cxnSpMk id="51" creationId="{6B4BBAEA-C7A8-0882-EF72-4BC4B12BC702}"/>
-          </ac:cxnSpMkLst>
-        </pc:cxnChg>
-      </pc:sldChg>
-      <pc:sldChg chg="addSp delSp modSp new mod">
-        <pc:chgData name="Jianguo Ma" userId="671318c9-574e-4361-a94e-119785a1fc7e" providerId="ADAL" clId="{682E28D5-B08A-4669-877E-54EAA8D1E0B3}" dt="2023-12-06T07:41:42.470" v="589" actId="1076"/>
-        <pc:sldMkLst>
-          <pc:docMk/>
-          <pc:sldMk cId="89673503" sldId="261"/>
-        </pc:sldMkLst>
-        <pc:spChg chg="del">
-          <ac:chgData name="Jianguo Ma" userId="671318c9-574e-4361-a94e-119785a1fc7e" providerId="ADAL" clId="{682E28D5-B08A-4669-877E-54EAA8D1E0B3}" dt="2023-12-06T05:27:10.130" v="158" actId="478"/>
-          <ac:spMkLst>
-            <pc:docMk/>
-            <pc:sldMk cId="89673503" sldId="261"/>
-            <ac:spMk id="2" creationId="{948D7EC8-20F7-09BB-0530-201C72CDEA7E}"/>
-          </ac:spMkLst>
-        </pc:spChg>
-        <pc:spChg chg="del">
-          <ac:chgData name="Jianguo Ma" userId="671318c9-574e-4361-a94e-119785a1fc7e" providerId="ADAL" clId="{682E28D5-B08A-4669-877E-54EAA8D1E0B3}" dt="2023-12-06T05:27:10.130" v="158" actId="478"/>
-          <ac:spMkLst>
-            <pc:docMk/>
-            <pc:sldMk cId="89673503" sldId="261"/>
-            <ac:spMk id="3" creationId="{8E611659-28A5-BFC3-A8A3-F310FD539314}"/>
-          </ac:spMkLst>
-        </pc:spChg>
-        <pc:spChg chg="add">
-          <ac:chgData name="Jianguo Ma" userId="671318c9-574e-4361-a94e-119785a1fc7e" providerId="ADAL" clId="{682E28D5-B08A-4669-877E-54EAA8D1E0B3}" dt="2023-12-06T05:27:10.915" v="159"/>
-          <ac:spMkLst>
-            <pc:docMk/>
-            <pc:sldMk cId="89673503" sldId="261"/>
-            <ac:spMk id="4" creationId="{45C9DA06-CC20-EF79-8000-F9029461336F}"/>
-          </ac:spMkLst>
-        </pc:spChg>
-        <pc:spChg chg="add del mod">
-          <ac:chgData name="Jianguo Ma" userId="671318c9-574e-4361-a94e-119785a1fc7e" providerId="ADAL" clId="{682E28D5-B08A-4669-877E-54EAA8D1E0B3}" dt="2023-12-06T05:48:57.864" v="289" actId="21"/>
-          <ac:spMkLst>
-            <pc:docMk/>
-            <pc:sldMk cId="89673503" sldId="261"/>
-            <ac:spMk id="12" creationId="{351A2E18-4198-08E8-6BBB-5662CE36083B}"/>
-          </ac:spMkLst>
-        </pc:spChg>
-        <pc:spChg chg="add del mod">
-          <ac:chgData name="Jianguo Ma" userId="671318c9-574e-4361-a94e-119785a1fc7e" providerId="ADAL" clId="{682E28D5-B08A-4669-877E-54EAA8D1E0B3}" dt="2023-12-06T05:48:57.864" v="289" actId="21"/>
-          <ac:spMkLst>
-            <pc:docMk/>
-            <pc:sldMk cId="89673503" sldId="261"/>
-            <ac:spMk id="16" creationId="{119E2846-F37A-D035-A438-1A23921618CA}"/>
-          </ac:spMkLst>
-        </pc:spChg>
-        <pc:spChg chg="add del mod ord">
-          <ac:chgData name="Jianguo Ma" userId="671318c9-574e-4361-a94e-119785a1fc7e" providerId="ADAL" clId="{682E28D5-B08A-4669-877E-54EAA8D1E0B3}" dt="2023-12-06T05:48:57.864" v="289" actId="21"/>
-          <ac:spMkLst>
-            <pc:docMk/>
-            <pc:sldMk cId="89673503" sldId="261"/>
-            <ac:spMk id="17" creationId="{986ED25A-7598-390F-C421-961CD05AC6A0}"/>
-          </ac:spMkLst>
-        </pc:spChg>
-        <pc:spChg chg="add del mod">
-          <ac:chgData name="Jianguo Ma" userId="671318c9-574e-4361-a94e-119785a1fc7e" providerId="ADAL" clId="{682E28D5-B08A-4669-877E-54EAA8D1E0B3}" dt="2023-12-06T05:48:57.864" v="289" actId="21"/>
-          <ac:spMkLst>
-            <pc:docMk/>
-            <pc:sldMk cId="89673503" sldId="261"/>
-            <ac:spMk id="18" creationId="{A988CE28-204A-B793-2BB9-D08CCC352EEB}"/>
-          </ac:spMkLst>
-        </pc:spChg>
-        <pc:spChg chg="add del mod">
-          <ac:chgData name="Jianguo Ma" userId="671318c9-574e-4361-a94e-119785a1fc7e" providerId="ADAL" clId="{682E28D5-B08A-4669-877E-54EAA8D1E0B3}" dt="2023-12-06T05:48:57.864" v="289" actId="21"/>
-          <ac:spMkLst>
-            <pc:docMk/>
-            <pc:sldMk cId="89673503" sldId="261"/>
-            <ac:spMk id="20" creationId="{BC29EF3B-99DA-8BF2-1533-88F8A367DC8A}"/>
-          </ac:spMkLst>
-        </pc:spChg>
-        <pc:picChg chg="add del mod">
-          <ac:chgData name="Jianguo Ma" userId="671318c9-574e-4361-a94e-119785a1fc7e" providerId="ADAL" clId="{682E28D5-B08A-4669-877E-54EAA8D1E0B3}" dt="2023-12-06T07:41:42.470" v="589" actId="1076"/>
-          <ac:picMkLst>
-            <pc:docMk/>
-            <pc:sldMk cId="89673503" sldId="261"/>
-            <ac:picMk id="6" creationId="{D3FA166B-AE55-8242-5329-F0A706E7D242}"/>
-          </ac:picMkLst>
-        </pc:picChg>
-        <pc:picChg chg="add del mod">
-          <ac:chgData name="Jianguo Ma" userId="671318c9-574e-4361-a94e-119785a1fc7e" providerId="ADAL" clId="{682E28D5-B08A-4669-877E-54EAA8D1E0B3}" dt="2023-12-06T05:48:57.864" v="289" actId="21"/>
-          <ac:picMkLst>
-            <pc:docMk/>
-            <pc:sldMk cId="89673503" sldId="261"/>
-            <ac:picMk id="8" creationId="{D9F5186E-CCE0-B5CC-D3E9-65B64B82452E}"/>
-          </ac:picMkLst>
-        </pc:picChg>
-        <pc:picChg chg="add del mod">
-          <ac:chgData name="Jianguo Ma" userId="671318c9-574e-4361-a94e-119785a1fc7e" providerId="ADAL" clId="{682E28D5-B08A-4669-877E-54EAA8D1E0B3}" dt="2023-12-06T05:48:57.864" v="289" actId="21"/>
-          <ac:picMkLst>
-            <pc:docMk/>
-            <pc:sldMk cId="89673503" sldId="261"/>
-            <ac:picMk id="9" creationId="{6EE72F1F-B754-B77E-08EA-CA417AD8AF8D}"/>
-          </ac:picMkLst>
-        </pc:picChg>
-        <pc:picChg chg="add del mod">
-          <ac:chgData name="Jianguo Ma" userId="671318c9-574e-4361-a94e-119785a1fc7e" providerId="ADAL" clId="{682E28D5-B08A-4669-877E-54EAA8D1E0B3}" dt="2023-12-06T07:30:58.620" v="494" actId="478"/>
-          <ac:picMkLst>
-            <pc:docMk/>
-            <pc:sldMk cId="89673503" sldId="261"/>
-            <ac:picMk id="22" creationId="{45BEC882-8AAF-9492-43D0-0EB5CFE47F50}"/>
-          </ac:picMkLst>
-        </pc:picChg>
-        <pc:picChg chg="add del mod">
-          <ac:chgData name="Jianguo Ma" userId="671318c9-574e-4361-a94e-119785a1fc7e" providerId="ADAL" clId="{682E28D5-B08A-4669-877E-54EAA8D1E0B3}" dt="2023-12-06T07:31:41.805" v="501" actId="478"/>
-          <ac:picMkLst>
-            <pc:docMk/>
-            <pc:sldMk cId="89673503" sldId="261"/>
-            <ac:picMk id="24" creationId="{2E117115-877F-FBA8-4235-C5E3EEAA9C67}"/>
-          </ac:picMkLst>
-        </pc:picChg>
-        <pc:picChg chg="add mod">
-          <ac:chgData name="Jianguo Ma" userId="671318c9-574e-4361-a94e-119785a1fc7e" providerId="ADAL" clId="{682E28D5-B08A-4669-877E-54EAA8D1E0B3}" dt="2023-12-06T07:41:36.328" v="585" actId="14100"/>
-          <ac:picMkLst>
-            <pc:docMk/>
-            <pc:sldMk cId="89673503" sldId="261"/>
-            <ac:picMk id="26" creationId="{EDFA44D3-F8E2-6FDD-6A88-861D441DC12E}"/>
-          </ac:picMkLst>
-        </pc:picChg>
-        <pc:picChg chg="add del mod">
-          <ac:chgData name="Jianguo Ma" userId="671318c9-574e-4361-a94e-119785a1fc7e" providerId="ADAL" clId="{682E28D5-B08A-4669-877E-54EAA8D1E0B3}" dt="2023-12-06T07:31:27.680" v="496" actId="478"/>
-          <ac:picMkLst>
-            <pc:docMk/>
-            <pc:sldMk cId="89673503" sldId="261"/>
-            <ac:picMk id="28" creationId="{85E7EA32-40EC-700C-C80A-B654C34F3FF4}"/>
-          </ac:picMkLst>
-        </pc:picChg>
-        <pc:picChg chg="add mod">
-          <ac:chgData name="Jianguo Ma" userId="671318c9-574e-4361-a94e-119785a1fc7e" providerId="ADAL" clId="{682E28D5-B08A-4669-877E-54EAA8D1E0B3}" dt="2023-12-06T07:41:40.571" v="588" actId="1076"/>
-          <ac:picMkLst>
-            <pc:docMk/>
-            <pc:sldMk cId="89673503" sldId="261"/>
-            <ac:picMk id="30" creationId="{DF64F32D-015B-7709-E4D2-A67D6F674251}"/>
-          </ac:picMkLst>
-        </pc:picChg>
-        <pc:cxnChg chg="add del mod">
-          <ac:chgData name="Jianguo Ma" userId="671318c9-574e-4361-a94e-119785a1fc7e" providerId="ADAL" clId="{682E28D5-B08A-4669-877E-54EAA8D1E0B3}" dt="2023-12-06T05:48:57.864" v="289" actId="21"/>
-          <ac:cxnSpMkLst>
-            <pc:docMk/>
-            <pc:sldMk cId="89673503" sldId="261"/>
-            <ac:cxnSpMk id="11" creationId="{6B4BBAEA-C7A8-0882-EF72-4BC4B12BC702}"/>
-          </ac:cxnSpMkLst>
-        </pc:cxnChg>
-      </pc:sldChg>
-    </pc:docChg>
-  </pc:docChgLst>
-  <pc:docChgLst>
     <pc:chgData name="Jianguo Ma" userId="671318c9-574e-4361-a94e-119785a1fc7e" providerId="ADAL" clId="{65527437-DD18-48FD-9773-12AA0B1A94B1}"/>
     <pc:docChg chg="delSld">
       <pc:chgData name="Jianguo Ma" userId="671318c9-574e-4361-a94e-119785a1fc7e" providerId="ADAL" clId="{65527437-DD18-48FD-9773-12AA0B1A94B1}" dt="2023-12-19T23:43:50.207" v="5" actId="47"/>
@@ -1111,6 +313,805 @@
     </pc:docChg>
   </pc:docChgLst>
   <pc:docChgLst>
+    <pc:chgData name="Jianguo Ma" userId="671318c9-574e-4361-a94e-119785a1fc7e" providerId="ADAL" clId="{682E28D5-B08A-4669-877E-54EAA8D1E0B3}"/>
+    <pc:docChg chg="undo redo custSel addSld modSld">
+      <pc:chgData name="Jianguo Ma" userId="671318c9-574e-4361-a94e-119785a1fc7e" providerId="ADAL" clId="{682E28D5-B08A-4669-877E-54EAA8D1E0B3}" dt="2023-12-06T07:41:42.470" v="589" actId="1076"/>
+      <pc:docMkLst>
+        <pc:docMk/>
+      </pc:docMkLst>
+      <pc:sldChg chg="addSp delSp modSp add mod">
+        <pc:chgData name="Jianguo Ma" userId="671318c9-574e-4361-a94e-119785a1fc7e" providerId="ADAL" clId="{682E28D5-B08A-4669-877E-54EAA8D1E0B3}" dt="2023-12-06T07:37:33.588" v="577" actId="478"/>
+        <pc:sldMkLst>
+          <pc:docMk/>
+          <pc:sldMk cId="2776496812" sldId="260"/>
+        </pc:sldMkLst>
+        <pc:spChg chg="del">
+          <ac:chgData name="Jianguo Ma" userId="671318c9-574e-4361-a94e-119785a1fc7e" providerId="ADAL" clId="{682E28D5-B08A-4669-877E-54EAA8D1E0B3}" dt="2023-12-06T05:49:09.202" v="292" actId="478"/>
+          <ac:spMkLst>
+            <pc:docMk/>
+            <pc:sldMk cId="2776496812" sldId="260"/>
+            <ac:spMk id="3" creationId="{581BF304-77F4-9620-EC94-A40FDEB9C681}"/>
+          </ac:spMkLst>
+        </pc:spChg>
+        <pc:spChg chg="mod">
+          <ac:chgData name="Jianguo Ma" userId="671318c9-574e-4361-a94e-119785a1fc7e" providerId="ADAL" clId="{682E28D5-B08A-4669-877E-54EAA8D1E0B3}" dt="2023-12-06T05:50:31.187" v="330" actId="1035"/>
+          <ac:spMkLst>
+            <pc:docMk/>
+            <pc:sldMk cId="2776496812" sldId="260"/>
+            <ac:spMk id="7" creationId="{FE2967D6-6230-4270-9CEA-2A43160BDF69}"/>
+          </ac:spMkLst>
+        </pc:spChg>
+        <pc:spChg chg="mod">
+          <ac:chgData name="Jianguo Ma" userId="671318c9-574e-4361-a94e-119785a1fc7e" providerId="ADAL" clId="{682E28D5-B08A-4669-877E-54EAA8D1E0B3}" dt="2023-12-06T05:50:31.187" v="330" actId="1035"/>
+          <ac:spMkLst>
+            <pc:docMk/>
+            <pc:sldMk cId="2776496812" sldId="260"/>
+            <ac:spMk id="9" creationId="{7116AAD1-72B7-4B73-8122-CF354EDC7966}"/>
+          </ac:spMkLst>
+        </pc:spChg>
+        <pc:spChg chg="mod">
+          <ac:chgData name="Jianguo Ma" userId="671318c9-574e-4361-a94e-119785a1fc7e" providerId="ADAL" clId="{682E28D5-B08A-4669-877E-54EAA8D1E0B3}" dt="2023-12-06T05:50:31.187" v="330" actId="1035"/>
+          <ac:spMkLst>
+            <pc:docMk/>
+            <pc:sldMk cId="2776496812" sldId="260"/>
+            <ac:spMk id="10" creationId="{077EAB8E-8BB4-4715-8D06-D009829FA432}"/>
+          </ac:spMkLst>
+        </pc:spChg>
+        <pc:spChg chg="mod ord">
+          <ac:chgData name="Jianguo Ma" userId="671318c9-574e-4361-a94e-119785a1fc7e" providerId="ADAL" clId="{682E28D5-B08A-4669-877E-54EAA8D1E0B3}" dt="2023-12-06T07:36:37.342" v="573" actId="167"/>
+          <ac:spMkLst>
+            <pc:docMk/>
+            <pc:sldMk cId="2776496812" sldId="260"/>
+            <ac:spMk id="11" creationId="{38D3C87C-6874-4F28-B98B-E0360ED436C8}"/>
+          </ac:spMkLst>
+        </pc:spChg>
+        <pc:spChg chg="add mod">
+          <ac:chgData name="Jianguo Ma" userId="671318c9-574e-4361-a94e-119785a1fc7e" providerId="ADAL" clId="{682E28D5-B08A-4669-877E-54EAA8D1E0B3}" dt="2023-12-06T05:50:31.187" v="330" actId="1035"/>
+          <ac:spMkLst>
+            <pc:docMk/>
+            <pc:sldMk cId="2776496812" sldId="260"/>
+            <ac:spMk id="12" creationId="{35D0E02A-2D7C-48E8-FFE3-0A1DE841768F}"/>
+          </ac:spMkLst>
+        </pc:spChg>
+        <pc:spChg chg="mod">
+          <ac:chgData name="Jianguo Ma" userId="671318c9-574e-4361-a94e-119785a1fc7e" providerId="ADAL" clId="{682E28D5-B08A-4669-877E-54EAA8D1E0B3}" dt="2023-12-06T05:50:31.187" v="330" actId="1035"/>
+          <ac:spMkLst>
+            <pc:docMk/>
+            <pc:sldMk cId="2776496812" sldId="260"/>
+            <ac:spMk id="13" creationId="{CA70E3F9-1016-4B98-B164-D97B86FC226B}"/>
+          </ac:spMkLst>
+        </pc:spChg>
+        <pc:spChg chg="mod">
+          <ac:chgData name="Jianguo Ma" userId="671318c9-574e-4361-a94e-119785a1fc7e" providerId="ADAL" clId="{682E28D5-B08A-4669-877E-54EAA8D1E0B3}" dt="2023-12-06T05:50:31.187" v="330" actId="1035"/>
+          <ac:spMkLst>
+            <pc:docMk/>
+            <pc:sldMk cId="2776496812" sldId="260"/>
+            <ac:spMk id="14" creationId="{E4D91ADC-B721-41C3-B446-4B901835756E}"/>
+          </ac:spMkLst>
+        </pc:spChg>
+        <pc:spChg chg="mod">
+          <ac:chgData name="Jianguo Ma" userId="671318c9-574e-4361-a94e-119785a1fc7e" providerId="ADAL" clId="{682E28D5-B08A-4669-877E-54EAA8D1E0B3}" dt="2023-12-06T05:50:31.187" v="330" actId="1035"/>
+          <ac:spMkLst>
+            <pc:docMk/>
+            <pc:sldMk cId="2776496812" sldId="260"/>
+            <ac:spMk id="20" creationId="{C4EA23F5-E1DC-40A6-9E5D-1FAFD096381F}"/>
+          </ac:spMkLst>
+        </pc:spChg>
+        <pc:spChg chg="mod">
+          <ac:chgData name="Jianguo Ma" userId="671318c9-574e-4361-a94e-119785a1fc7e" providerId="ADAL" clId="{682E28D5-B08A-4669-877E-54EAA8D1E0B3}" dt="2023-12-06T05:51:40.948" v="344" actId="1076"/>
+          <ac:spMkLst>
+            <pc:docMk/>
+            <pc:sldMk cId="2776496812" sldId="260"/>
+            <ac:spMk id="21" creationId="{056FC737-8EA4-AABC-3E0D-4C04272968AE}"/>
+          </ac:spMkLst>
+        </pc:spChg>
+        <pc:spChg chg="mod">
+          <ac:chgData name="Jianguo Ma" userId="671318c9-574e-4361-a94e-119785a1fc7e" providerId="ADAL" clId="{682E28D5-B08A-4669-877E-54EAA8D1E0B3}" dt="2023-12-06T05:50:31.187" v="330" actId="1035"/>
+          <ac:spMkLst>
+            <pc:docMk/>
+            <pc:sldMk cId="2776496812" sldId="260"/>
+            <ac:spMk id="23" creationId="{F1C8F032-F5FD-4021-B7DF-82B4CE75AF20}"/>
+          </ac:spMkLst>
+        </pc:spChg>
+        <pc:spChg chg="mod">
+          <ac:chgData name="Jianguo Ma" userId="671318c9-574e-4361-a94e-119785a1fc7e" providerId="ADAL" clId="{682E28D5-B08A-4669-877E-54EAA8D1E0B3}" dt="2023-12-06T05:52:41.698" v="357" actId="121"/>
+          <ac:spMkLst>
+            <pc:docMk/>
+            <pc:sldMk cId="2776496812" sldId="260"/>
+            <ac:spMk id="24" creationId="{DD36AEE8-718F-0FE4-64BC-F78A2122A2F5}"/>
+          </ac:spMkLst>
+        </pc:spChg>
+        <pc:spChg chg="mod">
+          <ac:chgData name="Jianguo Ma" userId="671318c9-574e-4361-a94e-119785a1fc7e" providerId="ADAL" clId="{682E28D5-B08A-4669-877E-54EAA8D1E0B3}" dt="2023-12-06T05:50:31.187" v="330" actId="1035"/>
+          <ac:spMkLst>
+            <pc:docMk/>
+            <pc:sldMk cId="2776496812" sldId="260"/>
+            <ac:spMk id="25" creationId="{0FDE0696-ABD6-4F86-BE26-44A76F5B4E29}"/>
+          </ac:spMkLst>
+        </pc:spChg>
+        <pc:spChg chg="mod">
+          <ac:chgData name="Jianguo Ma" userId="671318c9-574e-4361-a94e-119785a1fc7e" providerId="ADAL" clId="{682E28D5-B08A-4669-877E-54EAA8D1E0B3}" dt="2023-12-06T05:50:31.187" v="330" actId="1035"/>
+          <ac:spMkLst>
+            <pc:docMk/>
+            <pc:sldMk cId="2776496812" sldId="260"/>
+            <ac:spMk id="26" creationId="{2F95622D-3D09-406D-83D6-8F2BBB82E107}"/>
+          </ac:spMkLst>
+        </pc:spChg>
+        <pc:spChg chg="mod">
+          <ac:chgData name="Jianguo Ma" userId="671318c9-574e-4361-a94e-119785a1fc7e" providerId="ADAL" clId="{682E28D5-B08A-4669-877E-54EAA8D1E0B3}" dt="2023-12-06T05:50:31.187" v="330" actId="1035"/>
+          <ac:spMkLst>
+            <pc:docMk/>
+            <pc:sldMk cId="2776496812" sldId="260"/>
+            <ac:spMk id="28" creationId="{58D01351-EC49-4C01-9A43-5160470C75D7}"/>
+          </ac:spMkLst>
+        </pc:spChg>
+        <pc:spChg chg="add mod">
+          <ac:chgData name="Jianguo Ma" userId="671318c9-574e-4361-a94e-119785a1fc7e" providerId="ADAL" clId="{682E28D5-B08A-4669-877E-54EAA8D1E0B3}" dt="2023-12-06T05:25:22.924" v="152"/>
+          <ac:spMkLst>
+            <pc:docMk/>
+            <pc:sldMk cId="2776496812" sldId="260"/>
+            <ac:spMk id="29" creationId="{3BAABB1A-5B3B-EEC2-4DB0-D130030684A7}"/>
+          </ac:spMkLst>
+        </pc:spChg>
+        <pc:spChg chg="mod">
+          <ac:chgData name="Jianguo Ma" userId="671318c9-574e-4361-a94e-119785a1fc7e" providerId="ADAL" clId="{682E28D5-B08A-4669-877E-54EAA8D1E0B3}" dt="2023-12-06T05:50:31.187" v="330" actId="1035"/>
+          <ac:spMkLst>
+            <pc:docMk/>
+            <pc:sldMk cId="2776496812" sldId="260"/>
+            <ac:spMk id="30" creationId="{B9A5680C-EF73-477D-BD5B-2947E54E378E}"/>
+          </ac:spMkLst>
+        </pc:spChg>
+        <pc:spChg chg="mod">
+          <ac:chgData name="Jianguo Ma" userId="671318c9-574e-4361-a94e-119785a1fc7e" providerId="ADAL" clId="{682E28D5-B08A-4669-877E-54EAA8D1E0B3}" dt="2023-12-06T05:50:31.187" v="330" actId="1035"/>
+          <ac:spMkLst>
+            <pc:docMk/>
+            <pc:sldMk cId="2776496812" sldId="260"/>
+            <ac:spMk id="31" creationId="{10AF9324-55EB-4479-B174-6C49FBA26725}"/>
+          </ac:spMkLst>
+        </pc:spChg>
+        <pc:spChg chg="mod">
+          <ac:chgData name="Jianguo Ma" userId="671318c9-574e-4361-a94e-119785a1fc7e" providerId="ADAL" clId="{682E28D5-B08A-4669-877E-54EAA8D1E0B3}" dt="2023-12-06T05:50:31.187" v="330" actId="1035"/>
+          <ac:spMkLst>
+            <pc:docMk/>
+            <pc:sldMk cId="2776496812" sldId="260"/>
+            <ac:spMk id="32" creationId="{4A8B9EDD-7F3F-4BB0-9EB9-E9D6921F861A}"/>
+          </ac:spMkLst>
+        </pc:spChg>
+        <pc:spChg chg="mod">
+          <ac:chgData name="Jianguo Ma" userId="671318c9-574e-4361-a94e-119785a1fc7e" providerId="ADAL" clId="{682E28D5-B08A-4669-877E-54EAA8D1E0B3}" dt="2023-12-06T05:50:31.187" v="330" actId="1035"/>
+          <ac:spMkLst>
+            <pc:docMk/>
+            <pc:sldMk cId="2776496812" sldId="260"/>
+            <ac:spMk id="33" creationId="{3A6ACD97-6DD5-46CD-8E64-C644269FB80B}"/>
+          </ac:spMkLst>
+        </pc:spChg>
+        <pc:spChg chg="mod">
+          <ac:chgData name="Jianguo Ma" userId="671318c9-574e-4361-a94e-119785a1fc7e" providerId="ADAL" clId="{682E28D5-B08A-4669-877E-54EAA8D1E0B3}" dt="2023-12-06T07:33:36.912" v="513" actId="693"/>
+          <ac:spMkLst>
+            <pc:docMk/>
+            <pc:sldMk cId="2776496812" sldId="260"/>
+            <ac:spMk id="34" creationId="{F01A1ECE-FDC0-4144-AD2C-CDFF7DEDC0AD}"/>
+          </ac:spMkLst>
+        </pc:spChg>
+        <pc:spChg chg="mod">
+          <ac:chgData name="Jianguo Ma" userId="671318c9-574e-4361-a94e-119785a1fc7e" providerId="ADAL" clId="{682E28D5-B08A-4669-877E-54EAA8D1E0B3}" dt="2023-12-06T05:50:31.187" v="330" actId="1035"/>
+          <ac:spMkLst>
+            <pc:docMk/>
+            <pc:sldMk cId="2776496812" sldId="260"/>
+            <ac:spMk id="35" creationId="{805C3CF1-13CC-4A93-9C2F-92CABED48E64}"/>
+          </ac:spMkLst>
+        </pc:spChg>
+        <pc:spChg chg="add mod">
+          <ac:chgData name="Jianguo Ma" userId="671318c9-574e-4361-a94e-119785a1fc7e" providerId="ADAL" clId="{682E28D5-B08A-4669-877E-54EAA8D1E0B3}" dt="2023-12-06T05:26:57.221" v="154"/>
+          <ac:spMkLst>
+            <pc:docMk/>
+            <pc:sldMk cId="2776496812" sldId="260"/>
+            <ac:spMk id="36" creationId="{1DA24D9F-3845-3655-F578-BAEB6C05FA0D}"/>
+          </ac:spMkLst>
+        </pc:spChg>
+        <pc:spChg chg="add del mod">
+          <ac:chgData name="Jianguo Ma" userId="671318c9-574e-4361-a94e-119785a1fc7e" providerId="ADAL" clId="{682E28D5-B08A-4669-877E-54EAA8D1E0B3}" dt="2023-12-06T05:27:04.625" v="156" actId="478"/>
+          <ac:spMkLst>
+            <pc:docMk/>
+            <pc:sldMk cId="2776496812" sldId="260"/>
+            <ac:spMk id="37" creationId="{1DCB38EE-3D8D-BE9D-9414-C225FFD2DC78}"/>
+          </ac:spMkLst>
+        </pc:spChg>
+        <pc:spChg chg="add del mod">
+          <ac:chgData name="Jianguo Ma" userId="671318c9-574e-4361-a94e-119785a1fc7e" providerId="ADAL" clId="{682E28D5-B08A-4669-877E-54EAA8D1E0B3}" dt="2023-12-06T07:34:04.672" v="515" actId="478"/>
+          <ac:spMkLst>
+            <pc:docMk/>
+            <pc:sldMk cId="2776496812" sldId="260"/>
+            <ac:spMk id="38" creationId="{986ED25A-7598-390F-C421-961CD05AC6A0}"/>
+          </ac:spMkLst>
+        </pc:spChg>
+        <pc:spChg chg="mod">
+          <ac:chgData name="Jianguo Ma" userId="671318c9-574e-4361-a94e-119785a1fc7e" providerId="ADAL" clId="{682E28D5-B08A-4669-877E-54EAA8D1E0B3}" dt="2023-12-06T07:35:08.355" v="527" actId="14100"/>
+          <ac:spMkLst>
+            <pc:docMk/>
+            <pc:sldMk cId="2776496812" sldId="260"/>
+            <ac:spMk id="39" creationId="{BE25E3EB-4222-4437-9F8D-9D3C02473B66}"/>
+          </ac:spMkLst>
+        </pc:spChg>
+        <pc:spChg chg="del">
+          <ac:chgData name="Jianguo Ma" userId="671318c9-574e-4361-a94e-119785a1fc7e" providerId="ADAL" clId="{682E28D5-B08A-4669-877E-54EAA8D1E0B3}" dt="2023-12-06T05:49:05.235" v="290" actId="478"/>
+          <ac:spMkLst>
+            <pc:docMk/>
+            <pc:sldMk cId="2776496812" sldId="260"/>
+            <ac:spMk id="40" creationId="{7F66BE93-76AC-4FC0-9D8F-11DCD30D294E}"/>
+          </ac:spMkLst>
+        </pc:spChg>
+        <pc:spChg chg="mod">
+          <ac:chgData name="Jianguo Ma" userId="671318c9-574e-4361-a94e-119785a1fc7e" providerId="ADAL" clId="{682E28D5-B08A-4669-877E-54EAA8D1E0B3}" dt="2023-12-06T05:50:31.187" v="330" actId="1035"/>
+          <ac:spMkLst>
+            <pc:docMk/>
+            <pc:sldMk cId="2776496812" sldId="260"/>
+            <ac:spMk id="42" creationId="{502149A4-05F7-464F-83EE-836F82338573}"/>
+          </ac:spMkLst>
+        </pc:spChg>
+        <pc:spChg chg="mod ord">
+          <ac:chgData name="Jianguo Ma" userId="671318c9-574e-4361-a94e-119785a1fc7e" providerId="ADAL" clId="{682E28D5-B08A-4669-877E-54EAA8D1E0B3}" dt="2023-12-06T07:36:44.096" v="574" actId="167"/>
+          <ac:spMkLst>
+            <pc:docMk/>
+            <pc:sldMk cId="2776496812" sldId="260"/>
+            <ac:spMk id="43" creationId="{11960A80-4EE0-49FD-91B2-99BD128F94DA}"/>
+          </ac:spMkLst>
+        </pc:spChg>
+        <pc:spChg chg="mod">
+          <ac:chgData name="Jianguo Ma" userId="671318c9-574e-4361-a94e-119785a1fc7e" providerId="ADAL" clId="{682E28D5-B08A-4669-877E-54EAA8D1E0B3}" dt="2023-12-06T05:50:31.187" v="330" actId="1035"/>
+          <ac:spMkLst>
+            <pc:docMk/>
+            <pc:sldMk cId="2776496812" sldId="260"/>
+            <ac:spMk id="45" creationId="{000902AE-AFEC-4285-ABCC-B2F98BF0C5AB}"/>
+          </ac:spMkLst>
+        </pc:spChg>
+        <pc:spChg chg="mod">
+          <ac:chgData name="Jianguo Ma" userId="671318c9-574e-4361-a94e-119785a1fc7e" providerId="ADAL" clId="{682E28D5-B08A-4669-877E-54EAA8D1E0B3}" dt="2023-12-06T05:50:31.187" v="330" actId="1035"/>
+          <ac:spMkLst>
+            <pc:docMk/>
+            <pc:sldMk cId="2776496812" sldId="260"/>
+            <ac:spMk id="47" creationId="{6C290BE5-0A50-408F-9836-5B7A0A1DEF26}"/>
+          </ac:spMkLst>
+        </pc:spChg>
+        <pc:spChg chg="mod">
+          <ac:chgData name="Jianguo Ma" userId="671318c9-574e-4361-a94e-119785a1fc7e" providerId="ADAL" clId="{682E28D5-B08A-4669-877E-54EAA8D1E0B3}" dt="2023-12-06T05:50:31.187" v="330" actId="1035"/>
+          <ac:spMkLst>
+            <pc:docMk/>
+            <pc:sldMk cId="2776496812" sldId="260"/>
+            <ac:spMk id="50" creationId="{8F799904-F670-4031-A87B-1FDC8994D3EA}"/>
+          </ac:spMkLst>
+        </pc:spChg>
+        <pc:spChg chg="mod">
+          <ac:chgData name="Jianguo Ma" userId="671318c9-574e-4361-a94e-119785a1fc7e" providerId="ADAL" clId="{682E28D5-B08A-4669-877E-54EAA8D1E0B3}" dt="2023-12-06T05:50:31.187" v="330" actId="1035"/>
+          <ac:spMkLst>
+            <pc:docMk/>
+            <pc:sldMk cId="2776496812" sldId="260"/>
+            <ac:spMk id="52" creationId="{9D0B91F7-1D33-43A1-9807-FCBB882AD6F2}"/>
+          </ac:spMkLst>
+        </pc:spChg>
+        <pc:spChg chg="mod">
+          <ac:chgData name="Jianguo Ma" userId="671318c9-574e-4361-a94e-119785a1fc7e" providerId="ADAL" clId="{682E28D5-B08A-4669-877E-54EAA8D1E0B3}" dt="2023-12-06T05:50:31.187" v="330" actId="1035"/>
+          <ac:spMkLst>
+            <pc:docMk/>
+            <pc:sldMk cId="2776496812" sldId="260"/>
+            <ac:spMk id="53" creationId="{207F28D3-8FB7-4827-B8AB-1A97828DE312}"/>
+          </ac:spMkLst>
+        </pc:spChg>
+        <pc:spChg chg="mod">
+          <ac:chgData name="Jianguo Ma" userId="671318c9-574e-4361-a94e-119785a1fc7e" providerId="ADAL" clId="{682E28D5-B08A-4669-877E-54EAA8D1E0B3}" dt="2023-12-06T05:50:31.187" v="330" actId="1035"/>
+          <ac:spMkLst>
+            <pc:docMk/>
+            <pc:sldMk cId="2776496812" sldId="260"/>
+            <ac:spMk id="55" creationId="{4DBF1B48-8D40-4F00-BBBA-A24F2E7D4D20}"/>
+          </ac:spMkLst>
+        </pc:spChg>
+        <pc:spChg chg="add mod">
+          <ac:chgData name="Jianguo Ma" userId="671318c9-574e-4361-a94e-119785a1fc7e" providerId="ADAL" clId="{682E28D5-B08A-4669-877E-54EAA8D1E0B3}" dt="2023-12-06T07:36:15.563" v="571" actId="1037"/>
+          <ac:spMkLst>
+            <pc:docMk/>
+            <pc:sldMk cId="2776496812" sldId="260"/>
+            <ac:spMk id="56" creationId="{351A2E18-4198-08E8-6BBB-5662CE36083B}"/>
+          </ac:spMkLst>
+        </pc:spChg>
+        <pc:spChg chg="mod">
+          <ac:chgData name="Jianguo Ma" userId="671318c9-574e-4361-a94e-119785a1fc7e" providerId="ADAL" clId="{682E28D5-B08A-4669-877E-54EAA8D1E0B3}" dt="2023-12-06T05:50:31.187" v="330" actId="1035"/>
+          <ac:spMkLst>
+            <pc:docMk/>
+            <pc:sldMk cId="2776496812" sldId="260"/>
+            <ac:spMk id="57" creationId="{63C585E9-D7C1-4651-BA19-08FBAD44D502}"/>
+          </ac:spMkLst>
+        </pc:spChg>
+        <pc:spChg chg="mod">
+          <ac:chgData name="Jianguo Ma" userId="671318c9-574e-4361-a94e-119785a1fc7e" providerId="ADAL" clId="{682E28D5-B08A-4669-877E-54EAA8D1E0B3}" dt="2023-12-06T05:50:31.187" v="330" actId="1035"/>
+          <ac:spMkLst>
+            <pc:docMk/>
+            <pc:sldMk cId="2776496812" sldId="260"/>
+            <ac:spMk id="58" creationId="{585745E3-E781-43FF-9D9F-A78829559707}"/>
+          </ac:spMkLst>
+        </pc:spChg>
+        <pc:spChg chg="mod">
+          <ac:chgData name="Jianguo Ma" userId="671318c9-574e-4361-a94e-119785a1fc7e" providerId="ADAL" clId="{682E28D5-B08A-4669-877E-54EAA8D1E0B3}" dt="2023-12-06T05:50:31.187" v="330" actId="1035"/>
+          <ac:spMkLst>
+            <pc:docMk/>
+            <pc:sldMk cId="2776496812" sldId="260"/>
+            <ac:spMk id="59" creationId="{15699379-F6B0-4F29-9F76-FFE3D4B97F53}"/>
+          </ac:spMkLst>
+        </pc:spChg>
+        <pc:spChg chg="mod">
+          <ac:chgData name="Jianguo Ma" userId="671318c9-574e-4361-a94e-119785a1fc7e" providerId="ADAL" clId="{682E28D5-B08A-4669-877E-54EAA8D1E0B3}" dt="2023-12-06T05:50:31.187" v="330" actId="1035"/>
+          <ac:spMkLst>
+            <pc:docMk/>
+            <pc:sldMk cId="2776496812" sldId="260"/>
+            <ac:spMk id="60" creationId="{9CD25FBB-4444-4401-9CCD-DC877BC2FCBD}"/>
+          </ac:spMkLst>
+        </pc:spChg>
+        <pc:spChg chg="mod">
+          <ac:chgData name="Jianguo Ma" userId="671318c9-574e-4361-a94e-119785a1fc7e" providerId="ADAL" clId="{682E28D5-B08A-4669-877E-54EAA8D1E0B3}" dt="2023-12-06T07:33:48.788" v="514" actId="693"/>
+          <ac:spMkLst>
+            <pc:docMk/>
+            <pc:sldMk cId="2776496812" sldId="260"/>
+            <ac:spMk id="61" creationId="{87EB5FA6-CC6F-4B00-8C5C-FBB43E6BEC18}"/>
+          </ac:spMkLst>
+        </pc:spChg>
+        <pc:spChg chg="mod">
+          <ac:chgData name="Jianguo Ma" userId="671318c9-574e-4361-a94e-119785a1fc7e" providerId="ADAL" clId="{682E28D5-B08A-4669-877E-54EAA8D1E0B3}" dt="2023-12-06T05:50:31.187" v="330" actId="1035"/>
+          <ac:spMkLst>
+            <pc:docMk/>
+            <pc:sldMk cId="2776496812" sldId="260"/>
+            <ac:spMk id="62" creationId="{9C943479-F0C5-49F1-B220-629A4D947433}"/>
+          </ac:spMkLst>
+        </pc:spChg>
+        <pc:spChg chg="add del mod">
+          <ac:chgData name="Jianguo Ma" userId="671318c9-574e-4361-a94e-119785a1fc7e" providerId="ADAL" clId="{682E28D5-B08A-4669-877E-54EAA8D1E0B3}" dt="2023-12-06T07:34:27.478" v="520" actId="478"/>
+          <ac:spMkLst>
+            <pc:docMk/>
+            <pc:sldMk cId="2776496812" sldId="260"/>
+            <ac:spMk id="63" creationId="{119E2846-F37A-D035-A438-1A23921618CA}"/>
+          </ac:spMkLst>
+        </pc:spChg>
+        <pc:spChg chg="add del mod">
+          <ac:chgData name="Jianguo Ma" userId="671318c9-574e-4361-a94e-119785a1fc7e" providerId="ADAL" clId="{682E28D5-B08A-4669-877E-54EAA8D1E0B3}" dt="2023-12-06T06:02:00.173" v="483" actId="478"/>
+          <ac:spMkLst>
+            <pc:docMk/>
+            <pc:sldMk cId="2776496812" sldId="260"/>
+            <ac:spMk id="64" creationId="{A988CE28-204A-B793-2BB9-D08CCC352EEB}"/>
+          </ac:spMkLst>
+        </pc:spChg>
+        <pc:spChg chg="add mod">
+          <ac:chgData name="Jianguo Ma" userId="671318c9-574e-4361-a94e-119785a1fc7e" providerId="ADAL" clId="{682E28D5-B08A-4669-877E-54EAA8D1E0B3}" dt="2023-12-06T06:01:21.750" v="477" actId="1076"/>
+          <ac:spMkLst>
+            <pc:docMk/>
+            <pc:sldMk cId="2776496812" sldId="260"/>
+            <ac:spMk id="65" creationId="{BC29EF3B-99DA-8BF2-1533-88F8A367DC8A}"/>
+          </ac:spMkLst>
+        </pc:spChg>
+        <pc:spChg chg="mod">
+          <ac:chgData name="Jianguo Ma" userId="671318c9-574e-4361-a94e-119785a1fc7e" providerId="ADAL" clId="{682E28D5-B08A-4669-877E-54EAA8D1E0B3}" dt="2023-12-06T07:35:03.952" v="526" actId="14100"/>
+          <ac:spMkLst>
+            <pc:docMk/>
+            <pc:sldMk cId="2776496812" sldId="260"/>
+            <ac:spMk id="66" creationId="{E7103754-7C9D-46CD-A6DE-0B695BD86519}"/>
+          </ac:spMkLst>
+        </pc:spChg>
+        <pc:spChg chg="add del mod">
+          <ac:chgData name="Jianguo Ma" userId="671318c9-574e-4361-a94e-119785a1fc7e" providerId="ADAL" clId="{682E28D5-B08A-4669-877E-54EAA8D1E0B3}" dt="2023-12-06T05:58:58.145" v="449" actId="1076"/>
+          <ac:spMkLst>
+            <pc:docMk/>
+            <pc:sldMk cId="2776496812" sldId="260"/>
+            <ac:spMk id="67" creationId="{E88326E1-91F3-8DEE-6927-A621848DD81D}"/>
+          </ac:spMkLst>
+        </pc:spChg>
+        <pc:spChg chg="mod">
+          <ac:chgData name="Jianguo Ma" userId="671318c9-574e-4361-a94e-119785a1fc7e" providerId="ADAL" clId="{682E28D5-B08A-4669-877E-54EAA8D1E0B3}" dt="2023-12-06T05:50:31.187" v="330" actId="1035"/>
+          <ac:spMkLst>
+            <pc:docMk/>
+            <pc:sldMk cId="2776496812" sldId="260"/>
+            <ac:spMk id="69" creationId="{138CD46C-A2FF-43BF-8CBE-2408755A92DE}"/>
+          </ac:spMkLst>
+        </pc:spChg>
+        <pc:spChg chg="mod">
+          <ac:chgData name="Jianguo Ma" userId="671318c9-574e-4361-a94e-119785a1fc7e" providerId="ADAL" clId="{682E28D5-B08A-4669-877E-54EAA8D1E0B3}" dt="2023-12-06T05:50:31.187" v="330" actId="1035"/>
+          <ac:spMkLst>
+            <pc:docMk/>
+            <pc:sldMk cId="2776496812" sldId="260"/>
+            <ac:spMk id="70" creationId="{6453911D-E2A8-4EA5-9039-E048985FBB4A}"/>
+          </ac:spMkLst>
+        </pc:spChg>
+        <pc:spChg chg="mod">
+          <ac:chgData name="Jianguo Ma" userId="671318c9-574e-4361-a94e-119785a1fc7e" providerId="ADAL" clId="{682E28D5-B08A-4669-877E-54EAA8D1E0B3}" dt="2023-12-06T05:50:40.975" v="331" actId="14100"/>
+          <ac:spMkLst>
+            <pc:docMk/>
+            <pc:sldMk cId="2776496812" sldId="260"/>
+            <ac:spMk id="71" creationId="{D3B070FF-CF82-534A-B972-C6C9E4140726}"/>
+          </ac:spMkLst>
+        </pc:spChg>
+        <pc:spChg chg="del">
+          <ac:chgData name="Jianguo Ma" userId="671318c9-574e-4361-a94e-119785a1fc7e" providerId="ADAL" clId="{682E28D5-B08A-4669-877E-54EAA8D1E0B3}" dt="2023-12-06T05:49:11.301" v="293" actId="478"/>
+          <ac:spMkLst>
+            <pc:docMk/>
+            <pc:sldMk cId="2776496812" sldId="260"/>
+            <ac:spMk id="72" creationId="{2C946B3C-90FD-4D7B-9686-6F49BAC0FB05}"/>
+          </ac:spMkLst>
+        </pc:spChg>
+        <pc:spChg chg="add mod">
+          <ac:chgData name="Jianguo Ma" userId="671318c9-574e-4361-a94e-119785a1fc7e" providerId="ADAL" clId="{682E28D5-B08A-4669-877E-54EAA8D1E0B3}" dt="2023-12-06T07:34:25.704" v="519" actId="14100"/>
+          <ac:spMkLst>
+            <pc:docMk/>
+            <pc:sldMk cId="2776496812" sldId="260"/>
+            <ac:spMk id="79" creationId="{121D6AD4-F919-FBDF-BAE5-4CBEC6A69BA2}"/>
+          </ac:spMkLst>
+        </pc:spChg>
+        <pc:spChg chg="add mod ord">
+          <ac:chgData name="Jianguo Ma" userId="671318c9-574e-4361-a94e-119785a1fc7e" providerId="ADAL" clId="{682E28D5-B08A-4669-877E-54EAA8D1E0B3}" dt="2023-12-06T07:37:06.388" v="576" actId="14100"/>
+          <ac:spMkLst>
+            <pc:docMk/>
+            <pc:sldMk cId="2776496812" sldId="260"/>
+            <ac:spMk id="81" creationId="{16C6716B-DBF9-4E05-728E-3EA2CEA5A63B}"/>
+          </ac:spMkLst>
+        </pc:spChg>
+        <pc:spChg chg="del mod">
+          <ac:chgData name="Jianguo Ma" userId="671318c9-574e-4361-a94e-119785a1fc7e" providerId="ADAL" clId="{682E28D5-B08A-4669-877E-54EAA8D1E0B3}" dt="2023-12-06T07:37:33.588" v="577" actId="478"/>
+          <ac:spMkLst>
+            <pc:docMk/>
+            <pc:sldMk cId="2776496812" sldId="260"/>
+            <ac:spMk id="88" creationId="{B28D1FEF-C276-4469-8690-E4CBFCFE7451}"/>
+          </ac:spMkLst>
+        </pc:spChg>
+        <pc:picChg chg="mod">
+          <ac:chgData name="Jianguo Ma" userId="671318c9-574e-4361-a94e-119785a1fc7e" providerId="ADAL" clId="{682E28D5-B08A-4669-877E-54EAA8D1E0B3}" dt="2023-12-06T05:50:31.187" v="330" actId="1035"/>
+          <ac:picMkLst>
+            <pc:docMk/>
+            <pc:sldMk cId="2776496812" sldId="260"/>
+            <ac:picMk id="2" creationId="{E85E2877-C527-2241-957B-07005A9AB8EE}"/>
+          </ac:picMkLst>
+        </pc:picChg>
+        <pc:picChg chg="mod">
+          <ac:chgData name="Jianguo Ma" userId="671318c9-574e-4361-a94e-119785a1fc7e" providerId="ADAL" clId="{682E28D5-B08A-4669-877E-54EAA8D1E0B3}" dt="2023-12-06T05:50:31.187" v="330" actId="1035"/>
+          <ac:picMkLst>
+            <pc:docMk/>
+            <pc:sldMk cId="2776496812" sldId="260"/>
+            <ac:picMk id="4" creationId="{19D6F7ED-2644-4847-ADD0-9DC9EC58301D}"/>
+          </ac:picMkLst>
+        </pc:picChg>
+        <pc:picChg chg="del">
+          <ac:chgData name="Jianguo Ma" userId="671318c9-574e-4361-a94e-119785a1fc7e" providerId="ADAL" clId="{682E28D5-B08A-4669-877E-54EAA8D1E0B3}" dt="2023-12-06T05:24:59.505" v="146" actId="478"/>
+          <ac:picMkLst>
+            <pc:docMk/>
+            <pc:sldMk cId="2776496812" sldId="260"/>
+            <ac:picMk id="5" creationId="{84BF03D3-4482-A33C-1A1A-29FBF0EB6E33}"/>
+          </ac:picMkLst>
+        </pc:picChg>
+        <pc:picChg chg="mod">
+          <ac:chgData name="Jianguo Ma" userId="671318c9-574e-4361-a94e-119785a1fc7e" providerId="ADAL" clId="{682E28D5-B08A-4669-877E-54EAA8D1E0B3}" dt="2023-12-06T05:50:31.187" v="330" actId="1035"/>
+          <ac:picMkLst>
+            <pc:docMk/>
+            <pc:sldMk cId="2776496812" sldId="260"/>
+            <ac:picMk id="6" creationId="{C6B146D0-8D56-4769-9D4B-AC46330D95CB}"/>
+          </ac:picMkLst>
+        </pc:picChg>
+        <pc:picChg chg="mod">
+          <ac:chgData name="Jianguo Ma" userId="671318c9-574e-4361-a94e-119785a1fc7e" providerId="ADAL" clId="{682E28D5-B08A-4669-877E-54EAA8D1E0B3}" dt="2023-12-06T05:50:31.187" v="330" actId="1035"/>
+          <ac:picMkLst>
+            <pc:docMk/>
+            <pc:sldMk cId="2776496812" sldId="260"/>
+            <ac:picMk id="8" creationId="{C2DFB634-10C8-4581-931F-0034F190ADE4}"/>
+          </ac:picMkLst>
+        </pc:picChg>
+        <pc:picChg chg="del">
+          <ac:chgData name="Jianguo Ma" userId="671318c9-574e-4361-a94e-119785a1fc7e" providerId="ADAL" clId="{682E28D5-B08A-4669-877E-54EAA8D1E0B3}" dt="2023-12-06T05:25:01.470" v="147" actId="478"/>
+          <ac:picMkLst>
+            <pc:docMk/>
+            <pc:sldMk cId="2776496812" sldId="260"/>
+            <ac:picMk id="15" creationId="{E400EAC8-6B2C-8271-B63A-934E8F1465AE}"/>
+          </ac:picMkLst>
+        </pc:picChg>
+        <pc:picChg chg="mod">
+          <ac:chgData name="Jianguo Ma" userId="671318c9-574e-4361-a94e-119785a1fc7e" providerId="ADAL" clId="{682E28D5-B08A-4669-877E-54EAA8D1E0B3}" dt="2023-12-06T05:50:31.187" v="330" actId="1035"/>
+          <ac:picMkLst>
+            <pc:docMk/>
+            <pc:sldMk cId="2776496812" sldId="260"/>
+            <ac:picMk id="16" creationId="{D6AD0288-352A-4CFF-9E1E-7363BE84B6A3}"/>
+          </ac:picMkLst>
+        </pc:picChg>
+        <pc:picChg chg="mod">
+          <ac:chgData name="Jianguo Ma" userId="671318c9-574e-4361-a94e-119785a1fc7e" providerId="ADAL" clId="{682E28D5-B08A-4669-877E-54EAA8D1E0B3}" dt="2023-12-06T05:50:31.187" v="330" actId="1035"/>
+          <ac:picMkLst>
+            <pc:docMk/>
+            <pc:sldMk cId="2776496812" sldId="260"/>
+            <ac:picMk id="17" creationId="{FD7156D7-C7DE-4D23-B2FB-A07B59E223BB}"/>
+          </ac:picMkLst>
+        </pc:picChg>
+        <pc:picChg chg="mod">
+          <ac:chgData name="Jianguo Ma" userId="671318c9-574e-4361-a94e-119785a1fc7e" providerId="ADAL" clId="{682E28D5-B08A-4669-877E-54EAA8D1E0B3}" dt="2023-12-06T05:50:31.187" v="330" actId="1035"/>
+          <ac:picMkLst>
+            <pc:docMk/>
+            <pc:sldMk cId="2776496812" sldId="260"/>
+            <ac:picMk id="18" creationId="{FEC68F59-AF3B-4B8C-A6BC-F41FB6A798AC}"/>
+          </ac:picMkLst>
+        </pc:picChg>
+        <pc:picChg chg="mod">
+          <ac:chgData name="Jianguo Ma" userId="671318c9-574e-4361-a94e-119785a1fc7e" providerId="ADAL" clId="{682E28D5-B08A-4669-877E-54EAA8D1E0B3}" dt="2023-12-06T05:50:31.187" v="330" actId="1035"/>
+          <ac:picMkLst>
+            <pc:docMk/>
+            <pc:sldMk cId="2776496812" sldId="260"/>
+            <ac:picMk id="19" creationId="{9A9D1631-9FB4-456F-ADAD-2E4B5A3BA9F2}"/>
+          </ac:picMkLst>
+        </pc:picChg>
+        <pc:picChg chg="mod">
+          <ac:chgData name="Jianguo Ma" userId="671318c9-574e-4361-a94e-119785a1fc7e" providerId="ADAL" clId="{682E28D5-B08A-4669-877E-54EAA8D1E0B3}" dt="2023-12-06T05:50:31.187" v="330" actId="1035"/>
+          <ac:picMkLst>
+            <pc:docMk/>
+            <pc:sldMk cId="2776496812" sldId="260"/>
+            <ac:picMk id="22" creationId="{C8E47A49-114D-477D-9D6A-E9C7B018BA70}"/>
+          </ac:picMkLst>
+        </pc:picChg>
+        <pc:picChg chg="mod">
+          <ac:chgData name="Jianguo Ma" userId="671318c9-574e-4361-a94e-119785a1fc7e" providerId="ADAL" clId="{682E28D5-B08A-4669-877E-54EAA8D1E0B3}" dt="2023-12-06T05:50:31.187" v="330" actId="1035"/>
+          <ac:picMkLst>
+            <pc:docMk/>
+            <pc:sldMk cId="2776496812" sldId="260"/>
+            <ac:picMk id="27" creationId="{12C6F54D-3132-4766-895D-9467313FD940}"/>
+          </ac:picMkLst>
+        </pc:picChg>
+        <pc:picChg chg="add del mod">
+          <ac:chgData name="Jianguo Ma" userId="671318c9-574e-4361-a94e-119785a1fc7e" providerId="ADAL" clId="{682E28D5-B08A-4669-877E-54EAA8D1E0B3}" dt="2023-12-06T07:31:53.019" v="503" actId="478"/>
+          <ac:picMkLst>
+            <pc:docMk/>
+            <pc:sldMk cId="2776496812" sldId="260"/>
+            <ac:picMk id="41" creationId="{D9F5186E-CCE0-B5CC-D3E9-65B64B82452E}"/>
+          </ac:picMkLst>
+        </pc:picChg>
+        <pc:picChg chg="mod">
+          <ac:chgData name="Jianguo Ma" userId="671318c9-574e-4361-a94e-119785a1fc7e" providerId="ADAL" clId="{682E28D5-B08A-4669-877E-54EAA8D1E0B3}" dt="2023-12-06T05:50:31.187" v="330" actId="1035"/>
+          <ac:picMkLst>
+            <pc:docMk/>
+            <pc:sldMk cId="2776496812" sldId="260"/>
+            <ac:picMk id="44" creationId="{BE531519-3C31-4D37-A28B-D4661EEE3086}"/>
+          </ac:picMkLst>
+        </pc:picChg>
+        <pc:picChg chg="mod">
+          <ac:chgData name="Jianguo Ma" userId="671318c9-574e-4361-a94e-119785a1fc7e" providerId="ADAL" clId="{682E28D5-B08A-4669-877E-54EAA8D1E0B3}" dt="2023-12-06T05:50:31.187" v="330" actId="1035"/>
+          <ac:picMkLst>
+            <pc:docMk/>
+            <pc:sldMk cId="2776496812" sldId="260"/>
+            <ac:picMk id="46" creationId="{4B9C6593-0AC3-4D49-ACA2-22B420F62B66}"/>
+          </ac:picMkLst>
+        </pc:picChg>
+        <pc:picChg chg="add del mod">
+          <ac:chgData name="Jianguo Ma" userId="671318c9-574e-4361-a94e-119785a1fc7e" providerId="ADAL" clId="{682E28D5-B08A-4669-877E-54EAA8D1E0B3}" dt="2023-12-06T07:32:02.277" v="508" actId="478"/>
+          <ac:picMkLst>
+            <pc:docMk/>
+            <pc:sldMk cId="2776496812" sldId="260"/>
+            <ac:picMk id="48" creationId="{6EE72F1F-B754-B77E-08EA-CA417AD8AF8D}"/>
+          </ac:picMkLst>
+        </pc:picChg>
+        <pc:picChg chg="mod">
+          <ac:chgData name="Jianguo Ma" userId="671318c9-574e-4361-a94e-119785a1fc7e" providerId="ADAL" clId="{682E28D5-B08A-4669-877E-54EAA8D1E0B3}" dt="2023-12-06T05:50:31.187" v="330" actId="1035"/>
+          <ac:picMkLst>
+            <pc:docMk/>
+            <pc:sldMk cId="2776496812" sldId="260"/>
+            <ac:picMk id="49" creationId="{B30CCCAF-3E77-4C52-B202-D6B50B084339}"/>
+          </ac:picMkLst>
+        </pc:picChg>
+        <pc:picChg chg="mod">
+          <ac:chgData name="Jianguo Ma" userId="671318c9-574e-4361-a94e-119785a1fc7e" providerId="ADAL" clId="{682E28D5-B08A-4669-877E-54EAA8D1E0B3}" dt="2023-12-06T05:50:31.187" v="330" actId="1035"/>
+          <ac:picMkLst>
+            <pc:docMk/>
+            <pc:sldMk cId="2776496812" sldId="260"/>
+            <ac:picMk id="54" creationId="{907AEB1B-C13B-4B87-BC55-28FB749CD8FA}"/>
+          </ac:picMkLst>
+        </pc:picChg>
+        <pc:picChg chg="mod">
+          <ac:chgData name="Jianguo Ma" userId="671318c9-574e-4361-a94e-119785a1fc7e" providerId="ADAL" clId="{682E28D5-B08A-4669-877E-54EAA8D1E0B3}" dt="2023-12-06T05:50:31.187" v="330" actId="1035"/>
+          <ac:picMkLst>
+            <pc:docMk/>
+            <pc:sldMk cId="2776496812" sldId="260"/>
+            <ac:picMk id="74" creationId="{387F6FAA-286E-0341-9C0D-518213813B02}"/>
+          </ac:picMkLst>
+        </pc:picChg>
+        <pc:picChg chg="add mod">
+          <ac:chgData name="Jianguo Ma" userId="671318c9-574e-4361-a94e-119785a1fc7e" providerId="ADAL" clId="{682E28D5-B08A-4669-877E-54EAA8D1E0B3}" dt="2023-12-06T07:32:00.254" v="507" actId="14100"/>
+          <ac:picMkLst>
+            <pc:docMk/>
+            <pc:sldMk cId="2776496812" sldId="260"/>
+            <ac:picMk id="77" creationId="{5F2744A9-82F0-61EE-1F44-A12A9C251CAB}"/>
+          </ac:picMkLst>
+        </pc:picChg>
+        <pc:picChg chg="add mod">
+          <ac:chgData name="Jianguo Ma" userId="671318c9-574e-4361-a94e-119785a1fc7e" providerId="ADAL" clId="{682E28D5-B08A-4669-877E-54EAA8D1E0B3}" dt="2023-12-06T07:32:07.553" v="510" actId="1076"/>
+          <ac:picMkLst>
+            <pc:docMk/>
+            <pc:sldMk cId="2776496812" sldId="260"/>
+            <ac:picMk id="78" creationId="{6983C2ED-8B3B-9205-C743-A47288D0199E}"/>
+          </ac:picMkLst>
+        </pc:picChg>
+        <pc:picChg chg="mod">
+          <ac:chgData name="Jianguo Ma" userId="671318c9-574e-4361-a94e-119785a1fc7e" providerId="ADAL" clId="{682E28D5-B08A-4669-877E-54EAA8D1E0B3}" dt="2023-12-06T05:50:31.187" v="330" actId="1035"/>
+          <ac:picMkLst>
+            <pc:docMk/>
+            <pc:sldMk cId="2776496812" sldId="260"/>
+            <ac:picMk id="80" creationId="{B15523FD-16E4-44BC-ACE9-7D50F7412726}"/>
+          </ac:picMkLst>
+        </pc:picChg>
+        <pc:picChg chg="mod">
+          <ac:chgData name="Jianguo Ma" userId="671318c9-574e-4361-a94e-119785a1fc7e" providerId="ADAL" clId="{682E28D5-B08A-4669-877E-54EAA8D1E0B3}" dt="2023-12-06T05:50:31.187" v="330" actId="1035"/>
+          <ac:picMkLst>
+            <pc:docMk/>
+            <pc:sldMk cId="2776496812" sldId="260"/>
+            <ac:picMk id="82" creationId="{5BCE80F0-668B-4D4C-AC9D-F876DC5DB0D8}"/>
+          </ac:picMkLst>
+        </pc:picChg>
+        <pc:picChg chg="mod">
+          <ac:chgData name="Jianguo Ma" userId="671318c9-574e-4361-a94e-119785a1fc7e" providerId="ADAL" clId="{682E28D5-B08A-4669-877E-54EAA8D1E0B3}" dt="2023-12-06T05:50:31.187" v="330" actId="1035"/>
+          <ac:picMkLst>
+            <pc:docMk/>
+            <pc:sldMk cId="2776496812" sldId="260"/>
+            <ac:picMk id="84" creationId="{76CAEF40-FCB6-4ACF-A411-A46D93C56675}"/>
+          </ac:picMkLst>
+        </pc:picChg>
+        <pc:picChg chg="mod">
+          <ac:chgData name="Jianguo Ma" userId="671318c9-574e-4361-a94e-119785a1fc7e" providerId="ADAL" clId="{682E28D5-B08A-4669-877E-54EAA8D1E0B3}" dt="2023-12-06T05:50:31.187" v="330" actId="1035"/>
+          <ac:picMkLst>
+            <pc:docMk/>
+            <pc:sldMk cId="2776496812" sldId="260"/>
+            <ac:picMk id="1026" creationId="{379B589A-2621-473B-87D0-3CE1DCF1D5FB}"/>
+          </ac:picMkLst>
+        </pc:picChg>
+        <pc:cxnChg chg="add del mod">
+          <ac:chgData name="Jianguo Ma" userId="671318c9-574e-4361-a94e-119785a1fc7e" providerId="ADAL" clId="{682E28D5-B08A-4669-877E-54EAA8D1E0B3}" dt="2023-12-06T06:01:27.077" v="479" actId="1076"/>
+          <ac:cxnSpMkLst>
+            <pc:docMk/>
+            <pc:sldMk cId="2776496812" sldId="260"/>
+            <ac:cxnSpMk id="51" creationId="{6B4BBAEA-C7A8-0882-EF72-4BC4B12BC702}"/>
+          </ac:cxnSpMkLst>
+        </pc:cxnChg>
+      </pc:sldChg>
+      <pc:sldChg chg="addSp delSp modSp new mod">
+        <pc:chgData name="Jianguo Ma" userId="671318c9-574e-4361-a94e-119785a1fc7e" providerId="ADAL" clId="{682E28D5-B08A-4669-877E-54EAA8D1E0B3}" dt="2023-12-06T07:41:42.470" v="589" actId="1076"/>
+        <pc:sldMkLst>
+          <pc:docMk/>
+          <pc:sldMk cId="89673503" sldId="261"/>
+        </pc:sldMkLst>
+        <pc:spChg chg="del">
+          <ac:chgData name="Jianguo Ma" userId="671318c9-574e-4361-a94e-119785a1fc7e" providerId="ADAL" clId="{682E28D5-B08A-4669-877E-54EAA8D1E0B3}" dt="2023-12-06T05:27:10.130" v="158" actId="478"/>
+          <ac:spMkLst>
+            <pc:docMk/>
+            <pc:sldMk cId="89673503" sldId="261"/>
+            <ac:spMk id="2" creationId="{948D7EC8-20F7-09BB-0530-201C72CDEA7E}"/>
+          </ac:spMkLst>
+        </pc:spChg>
+        <pc:spChg chg="del">
+          <ac:chgData name="Jianguo Ma" userId="671318c9-574e-4361-a94e-119785a1fc7e" providerId="ADAL" clId="{682E28D5-B08A-4669-877E-54EAA8D1E0B3}" dt="2023-12-06T05:27:10.130" v="158" actId="478"/>
+          <ac:spMkLst>
+            <pc:docMk/>
+            <pc:sldMk cId="89673503" sldId="261"/>
+            <ac:spMk id="3" creationId="{8E611659-28A5-BFC3-A8A3-F310FD539314}"/>
+          </ac:spMkLst>
+        </pc:spChg>
+        <pc:spChg chg="add">
+          <ac:chgData name="Jianguo Ma" userId="671318c9-574e-4361-a94e-119785a1fc7e" providerId="ADAL" clId="{682E28D5-B08A-4669-877E-54EAA8D1E0B3}" dt="2023-12-06T05:27:10.915" v="159"/>
+          <ac:spMkLst>
+            <pc:docMk/>
+            <pc:sldMk cId="89673503" sldId="261"/>
+            <ac:spMk id="4" creationId="{45C9DA06-CC20-EF79-8000-F9029461336F}"/>
+          </ac:spMkLst>
+        </pc:spChg>
+        <pc:spChg chg="add del mod">
+          <ac:chgData name="Jianguo Ma" userId="671318c9-574e-4361-a94e-119785a1fc7e" providerId="ADAL" clId="{682E28D5-B08A-4669-877E-54EAA8D1E0B3}" dt="2023-12-06T05:48:57.864" v="289" actId="21"/>
+          <ac:spMkLst>
+            <pc:docMk/>
+            <pc:sldMk cId="89673503" sldId="261"/>
+            <ac:spMk id="12" creationId="{351A2E18-4198-08E8-6BBB-5662CE36083B}"/>
+          </ac:spMkLst>
+        </pc:spChg>
+        <pc:spChg chg="add del mod">
+          <ac:chgData name="Jianguo Ma" userId="671318c9-574e-4361-a94e-119785a1fc7e" providerId="ADAL" clId="{682E28D5-B08A-4669-877E-54EAA8D1E0B3}" dt="2023-12-06T05:48:57.864" v="289" actId="21"/>
+          <ac:spMkLst>
+            <pc:docMk/>
+            <pc:sldMk cId="89673503" sldId="261"/>
+            <ac:spMk id="16" creationId="{119E2846-F37A-D035-A438-1A23921618CA}"/>
+          </ac:spMkLst>
+        </pc:spChg>
+        <pc:spChg chg="add del mod ord">
+          <ac:chgData name="Jianguo Ma" userId="671318c9-574e-4361-a94e-119785a1fc7e" providerId="ADAL" clId="{682E28D5-B08A-4669-877E-54EAA8D1E0B3}" dt="2023-12-06T05:48:57.864" v="289" actId="21"/>
+          <ac:spMkLst>
+            <pc:docMk/>
+            <pc:sldMk cId="89673503" sldId="261"/>
+            <ac:spMk id="17" creationId="{986ED25A-7598-390F-C421-961CD05AC6A0}"/>
+          </ac:spMkLst>
+        </pc:spChg>
+        <pc:spChg chg="add del mod">
+          <ac:chgData name="Jianguo Ma" userId="671318c9-574e-4361-a94e-119785a1fc7e" providerId="ADAL" clId="{682E28D5-B08A-4669-877E-54EAA8D1E0B3}" dt="2023-12-06T05:48:57.864" v="289" actId="21"/>
+          <ac:spMkLst>
+            <pc:docMk/>
+            <pc:sldMk cId="89673503" sldId="261"/>
+            <ac:spMk id="18" creationId="{A988CE28-204A-B793-2BB9-D08CCC352EEB}"/>
+          </ac:spMkLst>
+        </pc:spChg>
+        <pc:spChg chg="add del mod">
+          <ac:chgData name="Jianguo Ma" userId="671318c9-574e-4361-a94e-119785a1fc7e" providerId="ADAL" clId="{682E28D5-B08A-4669-877E-54EAA8D1E0B3}" dt="2023-12-06T05:48:57.864" v="289" actId="21"/>
+          <ac:spMkLst>
+            <pc:docMk/>
+            <pc:sldMk cId="89673503" sldId="261"/>
+            <ac:spMk id="20" creationId="{BC29EF3B-99DA-8BF2-1533-88F8A367DC8A}"/>
+          </ac:spMkLst>
+        </pc:spChg>
+        <pc:picChg chg="add del mod">
+          <ac:chgData name="Jianguo Ma" userId="671318c9-574e-4361-a94e-119785a1fc7e" providerId="ADAL" clId="{682E28D5-B08A-4669-877E-54EAA8D1E0B3}" dt="2023-12-06T07:41:42.470" v="589" actId="1076"/>
+          <ac:picMkLst>
+            <pc:docMk/>
+            <pc:sldMk cId="89673503" sldId="261"/>
+            <ac:picMk id="6" creationId="{D3FA166B-AE55-8242-5329-F0A706E7D242}"/>
+          </ac:picMkLst>
+        </pc:picChg>
+        <pc:picChg chg="add del mod">
+          <ac:chgData name="Jianguo Ma" userId="671318c9-574e-4361-a94e-119785a1fc7e" providerId="ADAL" clId="{682E28D5-B08A-4669-877E-54EAA8D1E0B3}" dt="2023-12-06T05:48:57.864" v="289" actId="21"/>
+          <ac:picMkLst>
+            <pc:docMk/>
+            <pc:sldMk cId="89673503" sldId="261"/>
+            <ac:picMk id="8" creationId="{D9F5186E-CCE0-B5CC-D3E9-65B64B82452E}"/>
+          </ac:picMkLst>
+        </pc:picChg>
+        <pc:picChg chg="add del mod">
+          <ac:chgData name="Jianguo Ma" userId="671318c9-574e-4361-a94e-119785a1fc7e" providerId="ADAL" clId="{682E28D5-B08A-4669-877E-54EAA8D1E0B3}" dt="2023-12-06T05:48:57.864" v="289" actId="21"/>
+          <ac:picMkLst>
+            <pc:docMk/>
+            <pc:sldMk cId="89673503" sldId="261"/>
+            <ac:picMk id="9" creationId="{6EE72F1F-B754-B77E-08EA-CA417AD8AF8D}"/>
+          </ac:picMkLst>
+        </pc:picChg>
+        <pc:picChg chg="add del mod">
+          <ac:chgData name="Jianguo Ma" userId="671318c9-574e-4361-a94e-119785a1fc7e" providerId="ADAL" clId="{682E28D5-B08A-4669-877E-54EAA8D1E0B3}" dt="2023-12-06T07:30:58.620" v="494" actId="478"/>
+          <ac:picMkLst>
+            <pc:docMk/>
+            <pc:sldMk cId="89673503" sldId="261"/>
+            <ac:picMk id="22" creationId="{45BEC882-8AAF-9492-43D0-0EB5CFE47F50}"/>
+          </ac:picMkLst>
+        </pc:picChg>
+        <pc:picChg chg="add del mod">
+          <ac:chgData name="Jianguo Ma" userId="671318c9-574e-4361-a94e-119785a1fc7e" providerId="ADAL" clId="{682E28D5-B08A-4669-877E-54EAA8D1E0B3}" dt="2023-12-06T07:31:41.805" v="501" actId="478"/>
+          <ac:picMkLst>
+            <pc:docMk/>
+            <pc:sldMk cId="89673503" sldId="261"/>
+            <ac:picMk id="24" creationId="{2E117115-877F-FBA8-4235-C5E3EEAA9C67}"/>
+          </ac:picMkLst>
+        </pc:picChg>
+        <pc:picChg chg="add mod">
+          <ac:chgData name="Jianguo Ma" userId="671318c9-574e-4361-a94e-119785a1fc7e" providerId="ADAL" clId="{682E28D5-B08A-4669-877E-54EAA8D1E0B3}" dt="2023-12-06T07:41:36.328" v="585" actId="14100"/>
+          <ac:picMkLst>
+            <pc:docMk/>
+            <pc:sldMk cId="89673503" sldId="261"/>
+            <ac:picMk id="26" creationId="{EDFA44D3-F8E2-6FDD-6A88-861D441DC12E}"/>
+          </ac:picMkLst>
+        </pc:picChg>
+        <pc:picChg chg="add del mod">
+          <ac:chgData name="Jianguo Ma" userId="671318c9-574e-4361-a94e-119785a1fc7e" providerId="ADAL" clId="{682E28D5-B08A-4669-877E-54EAA8D1E0B3}" dt="2023-12-06T07:31:27.680" v="496" actId="478"/>
+          <ac:picMkLst>
+            <pc:docMk/>
+            <pc:sldMk cId="89673503" sldId="261"/>
+            <ac:picMk id="28" creationId="{85E7EA32-40EC-700C-C80A-B654C34F3FF4}"/>
+          </ac:picMkLst>
+        </pc:picChg>
+        <pc:picChg chg="add mod">
+          <ac:chgData name="Jianguo Ma" userId="671318c9-574e-4361-a94e-119785a1fc7e" providerId="ADAL" clId="{682E28D5-B08A-4669-877E-54EAA8D1E0B3}" dt="2023-12-06T07:41:40.571" v="588" actId="1076"/>
+          <ac:picMkLst>
+            <pc:docMk/>
+            <pc:sldMk cId="89673503" sldId="261"/>
+            <ac:picMk id="30" creationId="{DF64F32D-015B-7709-E4D2-A67D6F674251}"/>
+          </ac:picMkLst>
+        </pc:picChg>
+        <pc:cxnChg chg="add del mod">
+          <ac:chgData name="Jianguo Ma" userId="671318c9-574e-4361-a94e-119785a1fc7e" providerId="ADAL" clId="{682E28D5-B08A-4669-877E-54EAA8D1E0B3}" dt="2023-12-06T05:48:57.864" v="289" actId="21"/>
+          <ac:cxnSpMkLst>
+            <pc:docMk/>
+            <pc:sldMk cId="89673503" sldId="261"/>
+            <ac:cxnSpMk id="11" creationId="{6B4BBAEA-C7A8-0882-EF72-4BC4B12BC702}"/>
+          </ac:cxnSpMkLst>
+        </pc:cxnChg>
+      </pc:sldChg>
+    </pc:docChg>
+  </pc:docChgLst>
+  <pc:docChgLst>
     <pc:chgData name="Jianguo Ma" userId="671318c9-574e-4361-a94e-119785a1fc7e" providerId="ADAL" clId="{4C262ED4-5D98-4019-B3A1-0486D77113F5}"/>
     <pc:docChg chg="undo redo custSel addSld delSld modSld">
       <pc:chgData name="Jianguo Ma" userId="671318c9-574e-4361-a94e-119785a1fc7e" providerId="ADAL" clId="{4C262ED4-5D98-4019-B3A1-0486D77113F5}" dt="2022-04-25T01:37:37.304" v="586" actId="1035"/>
@@ -1536,7 +1537,7 @@
           <a:p>
             <a:fld id="{4C0EFAC8-4035-4903-8ED5-0E252FA8C5B4}" type="datetimeFigureOut">
               <a:rPr lang="en-US" smtClean="0"/>
-              <a:t>12/20/2023</a:t>
+              <a:t>12/21/23</a:t>
             </a:fld>
             <a:endParaRPr lang="en-US"/>
           </a:p>
@@ -2034,7 +2035,7 @@
           <a:p>
             <a:fld id="{492724FA-E535-4207-9CFC-535F01FD34A1}" type="datetimeFigureOut">
               <a:rPr lang="en-US" smtClean="0"/>
-              <a:t>12/20/2023</a:t>
+              <a:t>12/21/23</a:t>
             </a:fld>
             <a:endParaRPr lang="en-US"/>
           </a:p>
@@ -2232,7 +2233,7 @@
           <a:p>
             <a:fld id="{492724FA-E535-4207-9CFC-535F01FD34A1}" type="datetimeFigureOut">
               <a:rPr lang="en-US" smtClean="0"/>
-              <a:t>12/20/2023</a:t>
+              <a:t>12/21/23</a:t>
             </a:fld>
             <a:endParaRPr lang="en-US"/>
           </a:p>
@@ -2440,7 +2441,7 @@
           <a:p>
             <a:fld id="{492724FA-E535-4207-9CFC-535F01FD34A1}" type="datetimeFigureOut">
               <a:rPr lang="en-US" smtClean="0"/>
-              <a:t>12/20/2023</a:t>
+              <a:t>12/21/23</a:t>
             </a:fld>
             <a:endParaRPr lang="en-US"/>
           </a:p>
@@ -2638,7 +2639,7 @@
           <a:p>
             <a:fld id="{492724FA-E535-4207-9CFC-535F01FD34A1}" type="datetimeFigureOut">
               <a:rPr lang="en-US" smtClean="0"/>
-              <a:t>12/20/2023</a:t>
+              <a:t>12/21/23</a:t>
             </a:fld>
             <a:endParaRPr lang="en-US"/>
           </a:p>
@@ -2913,7 +2914,7 @@
           <a:p>
             <a:fld id="{492724FA-E535-4207-9CFC-535F01FD34A1}" type="datetimeFigureOut">
               <a:rPr lang="en-US" smtClean="0"/>
-              <a:t>12/20/2023</a:t>
+              <a:t>12/21/23</a:t>
             </a:fld>
             <a:endParaRPr lang="en-US"/>
           </a:p>
@@ -3178,7 +3179,7 @@
           <a:p>
             <a:fld id="{492724FA-E535-4207-9CFC-535F01FD34A1}" type="datetimeFigureOut">
               <a:rPr lang="en-US" smtClean="0"/>
-              <a:t>12/20/2023</a:t>
+              <a:t>12/21/23</a:t>
             </a:fld>
             <a:endParaRPr lang="en-US"/>
           </a:p>
@@ -3590,7 +3591,7 @@
           <a:p>
             <a:fld id="{492724FA-E535-4207-9CFC-535F01FD34A1}" type="datetimeFigureOut">
               <a:rPr lang="en-US" smtClean="0"/>
-              <a:t>12/20/2023</a:t>
+              <a:t>12/21/23</a:t>
             </a:fld>
             <a:endParaRPr lang="en-US"/>
           </a:p>
@@ -3731,7 +3732,7 @@
           <a:p>
             <a:fld id="{492724FA-E535-4207-9CFC-535F01FD34A1}" type="datetimeFigureOut">
               <a:rPr lang="en-US" smtClean="0"/>
-              <a:t>12/20/2023</a:t>
+              <a:t>12/21/23</a:t>
             </a:fld>
             <a:endParaRPr lang="en-US"/>
           </a:p>
@@ -3844,7 +3845,7 @@
           <a:p>
             <a:fld id="{492724FA-E535-4207-9CFC-535F01FD34A1}" type="datetimeFigureOut">
               <a:rPr lang="en-US" smtClean="0"/>
-              <a:t>12/20/2023</a:t>
+              <a:t>12/21/23</a:t>
             </a:fld>
             <a:endParaRPr lang="en-US"/>
           </a:p>
@@ -4155,7 +4156,7 @@
           <a:p>
             <a:fld id="{492724FA-E535-4207-9CFC-535F01FD34A1}" type="datetimeFigureOut">
               <a:rPr lang="en-US" smtClean="0"/>
-              <a:t>12/20/2023</a:t>
+              <a:t>12/21/23</a:t>
             </a:fld>
             <a:endParaRPr lang="en-US"/>
           </a:p>
@@ -4443,7 +4444,7 @@
           <a:p>
             <a:fld id="{492724FA-E535-4207-9CFC-535F01FD34A1}" type="datetimeFigureOut">
               <a:rPr lang="en-US" smtClean="0"/>
-              <a:t>12/20/2023</a:t>
+              <a:t>12/21/23</a:t>
             </a:fld>
             <a:endParaRPr lang="en-US"/>
           </a:p>
@@ -4684,7 +4685,7 @@
           <a:p>
             <a:fld id="{492724FA-E535-4207-9CFC-535F01FD34A1}" type="datetimeFigureOut">
               <a:rPr lang="en-US" smtClean="0"/>
-              <a:t>12/20/2023</a:t>
+              <a:t>12/21/23</a:t>
             </a:fld>
             <a:endParaRPr lang="en-US"/>
           </a:p>
@@ -8129,6 +8130,1046 @@
     <p:extLst>
       <p:ext uri="{BB962C8B-B14F-4D97-AF65-F5344CB8AC3E}">
         <p14:creationId xmlns:p14="http://schemas.microsoft.com/office/powerpoint/2010/main" val="2420491399"/>
+      </p:ext>
+    </p:extLst>
+  </p:cSld>
+  <p:clrMapOvr>
+    <a:masterClrMapping/>
+  </p:clrMapOvr>
+</p:sld>
+</file>
+
+<file path=ppt/slides/slide2.xml><?xml version="1.0" encoding="utf-8"?>
+<p:sld xmlns:a="http://schemas.openxmlformats.org/drawingml/2006/main" xmlns:r="http://schemas.openxmlformats.org/officeDocument/2006/relationships" xmlns:p="http://schemas.openxmlformats.org/presentationml/2006/main">
+  <p:cSld>
+    <p:spTree>
+      <p:nvGrpSpPr>
+        <p:cNvPr id="1" name=""/>
+        <p:cNvGrpSpPr/>
+        <p:nvPr/>
+      </p:nvGrpSpPr>
+      <p:grpSpPr>
+        <a:xfrm>
+          <a:off x="0" y="0"/>
+          <a:ext cx="0" cy="0"/>
+          <a:chOff x="0" y="0"/>
+          <a:chExt cx="0" cy="0"/>
+        </a:xfrm>
+      </p:grpSpPr>
+      <p:sp>
+        <p:nvSpPr>
+          <p:cNvPr id="2" name="Title 1">
+            <a:extLst>
+              <a:ext uri="{FF2B5EF4-FFF2-40B4-BE49-F238E27FC236}">
+                <a16:creationId xmlns:a16="http://schemas.microsoft.com/office/drawing/2014/main" id="{ADC2FB02-9076-8C63-EDBC-217EA18EB4BC}"/>
+              </a:ext>
+            </a:extLst>
+          </p:cNvPr>
+          <p:cNvSpPr>
+            <a:spLocks noGrp="1"/>
+          </p:cNvSpPr>
+          <p:nvPr>
+            <p:ph type="title"/>
+          </p:nvPr>
+        </p:nvSpPr>
+        <p:spPr/>
+        <p:txBody>
+          <a:bodyPr/>
+          <a:lstStyle/>
+          <a:p>
+            <a:r>
+              <a:rPr lang="en-US"/>
+              <a:t>Metadata</a:t>
+            </a:r>
+          </a:p>
+        </p:txBody>
+      </p:sp>
+      <p:sp>
+        <p:nvSpPr>
+          <p:cNvPr id="3" name="Content Placeholder 2">
+            <a:extLst>
+              <a:ext uri="{FF2B5EF4-FFF2-40B4-BE49-F238E27FC236}">
+                <a16:creationId xmlns:a16="http://schemas.microsoft.com/office/drawing/2014/main" id="{6D7047BB-0B51-68B2-14C6-DEEF96830BDA}"/>
+              </a:ext>
+            </a:extLst>
+          </p:cNvPr>
+          <p:cNvSpPr>
+            <a:spLocks noGrp="1"/>
+          </p:cNvSpPr>
+          <p:nvPr>
+            <p:ph idx="1"/>
+          </p:nvPr>
+        </p:nvSpPr>
+        <p:spPr/>
+        <p:txBody>
+          <a:bodyPr/>
+          <a:lstStyle/>
+          <a:p>
+            <a:endParaRPr lang="en-US" dirty="0"/>
+          </a:p>
+          <a:p>
+            <a:pPr marL="457200" lvl="1" indent="0">
+              <a:buNone/>
+            </a:pPr>
+            <a:endParaRPr lang="en-US" dirty="0"/>
+          </a:p>
+        </p:txBody>
+      </p:sp>
+      <p:graphicFrame>
+        <p:nvGraphicFramePr>
+          <p:cNvPr id="4" name="Table 3">
+            <a:extLst>
+              <a:ext uri="{FF2B5EF4-FFF2-40B4-BE49-F238E27FC236}">
+                <a16:creationId xmlns:a16="http://schemas.microsoft.com/office/drawing/2014/main" id="{C32F86BF-61A5-EFE4-FB20-A3638039D334}"/>
+              </a:ext>
+            </a:extLst>
+          </p:cNvPr>
+          <p:cNvGraphicFramePr>
+            <a:graphicFrameLocks noGrp="1"/>
+          </p:cNvGraphicFramePr>
+          <p:nvPr>
+            <p:extLst>
+              <p:ext uri="{D42A27DB-BD31-4B8C-83A1-F6EECF244321}">
+                <p14:modId xmlns:p14="http://schemas.microsoft.com/office/powerpoint/2010/main" val="3340984185"/>
+              </p:ext>
+            </p:extLst>
+          </p:nvPr>
+        </p:nvGraphicFramePr>
+        <p:xfrm>
+          <a:off x="3350104" y="443638"/>
+          <a:ext cx="8323108" cy="5720080"/>
+        </p:xfrm>
+        <a:graphic>
+          <a:graphicData uri="http://schemas.openxmlformats.org/drawingml/2006/table">
+            <a:tbl>
+              <a:tblPr firstRow="1" bandRow="1">
+                <a:tableStyleId>{5940675A-B579-460E-94D1-54222C63F5DA}</a:tableStyleId>
+              </a:tblPr>
+              <a:tblGrid>
+                <a:gridCol w="602075">
+                  <a:extLst>
+                    <a:ext uri="{9D8B030D-6E8A-4147-A177-3AD203B41FA5}">
+                      <a16:colId xmlns:a16="http://schemas.microsoft.com/office/drawing/2014/main" val="2408098783"/>
+                    </a:ext>
+                  </a:extLst>
+                </a:gridCol>
+                <a:gridCol w="2088525">
+                  <a:extLst>
+                    <a:ext uri="{9D8B030D-6E8A-4147-A177-3AD203B41FA5}">
+                      <a16:colId xmlns:a16="http://schemas.microsoft.com/office/drawing/2014/main" val="3407174499"/>
+                    </a:ext>
+                  </a:extLst>
+                </a:gridCol>
+                <a:gridCol w="1695282">
+                  <a:extLst>
+                    <a:ext uri="{9D8B030D-6E8A-4147-A177-3AD203B41FA5}">
+                      <a16:colId xmlns:a16="http://schemas.microsoft.com/office/drawing/2014/main" val="2112535447"/>
+                    </a:ext>
+                  </a:extLst>
+                </a:gridCol>
+                <a:gridCol w="3937226">
+                  <a:extLst>
+                    <a:ext uri="{9D8B030D-6E8A-4147-A177-3AD203B41FA5}">
+                      <a16:colId xmlns:a16="http://schemas.microsoft.com/office/drawing/2014/main" val="2309598973"/>
+                    </a:ext>
+                  </a:extLst>
+                </a:gridCol>
+              </a:tblGrid>
+              <a:tr h="0">
+                <a:tc>
+                  <a:txBody>
+                    <a:bodyPr/>
+                    <a:lstStyle/>
+                    <a:p>
+                      <a:r>
+                        <a:rPr lang="en-US"/>
+                        <a:t>3</a:t>
+                      </a:r>
+                    </a:p>
+                  </a:txBody>
+                  <a:tcPr/>
+                </a:tc>
+                <a:tc>
+                  <a:txBody>
+                    <a:bodyPr/>
+                    <a:lstStyle/>
+                    <a:p>
+                      <a:pPr marL="0" marR="0" indent="0" algn="l" defTabSz="914400" rtl="0" eaLnBrk="1" fontAlgn="auto" latinLnBrk="0" hangingPunct="1">
+                        <a:lnSpc>
+                          <a:spcPct val="100000"/>
+                        </a:lnSpc>
+                        <a:spcBef>
+                          <a:spcPts val="0"/>
+                        </a:spcBef>
+                        <a:spcAft>
+                          <a:spcPts val="0"/>
+                        </a:spcAft>
+                        <a:buClrTx/>
+                        <a:buSzTx/>
+                        <a:buFontTx/>
+                        <a:buNone/>
+                        <a:tabLst/>
+                        <a:defRPr/>
+                      </a:pPr>
+                      <a:r>
+                        <a:rPr lang="en-US" dirty="0"/>
+                        <a:t>Referenced in article generated from https://</a:t>
+                      </a:r>
+                      <a:r>
+                        <a:rPr lang="en-US" dirty="0" err="1"/>
+                        <a:t>github.com</a:t>
+                      </a:r>
+                      <a:r>
+                        <a:rPr lang="en-US" dirty="0"/>
+                        <a:t>/</a:t>
+                      </a:r>
+                      <a:r>
+                        <a:rPr lang="en-US" dirty="0" err="1"/>
+                        <a:t>MicrosoftDocs</a:t>
+                      </a:r>
+                      <a:r>
+                        <a:rPr lang="en-US"/>
+                        <a:t>/azure-dev-docs-pr/pull/5178</a:t>
+                      </a:r>
+                      <a:endParaRPr lang="en-US" dirty="0"/>
+                    </a:p>
+                  </a:txBody>
+                  <a:tcPr/>
+                </a:tc>
+                <a:tc>
+                  <a:txBody>
+                    <a:bodyPr/>
+                    <a:lstStyle/>
+                    <a:p>
+                      <a:endParaRPr lang="en-US" dirty="0"/>
+                    </a:p>
+                  </a:txBody>
+                  <a:tcPr/>
+                </a:tc>
+                <a:tc>
+                  <a:txBody>
+                    <a:bodyPr/>
+                    <a:lstStyle/>
+                    <a:p>
+                      <a:endParaRPr lang="en-US" dirty="0"/>
+                    </a:p>
+                  </a:txBody>
+                  <a:tcPr/>
+                </a:tc>
+                <a:extLst>
+                  <a:ext uri="{0D108BD9-81ED-4DB2-BD59-A6C34878D82A}">
+                    <a16:rowId xmlns:a16="http://schemas.microsoft.com/office/drawing/2014/main" val="4031396326"/>
+                  </a:ext>
+                </a:extLst>
+              </a:tr>
+              <a:tr h="370840">
+                <a:tc>
+                  <a:txBody>
+                    <a:bodyPr/>
+                    <a:lstStyle/>
+                    <a:p>
+                      <a:r>
+                        <a:rPr lang="en-US"/>
+                        <a:t>4</a:t>
+                      </a:r>
+                    </a:p>
+                  </a:txBody>
+                  <a:tcPr/>
+                </a:tc>
+                <a:tc>
+                  <a:txBody>
+                    <a:bodyPr/>
+                    <a:lstStyle/>
+                    <a:p>
+                      <a:pPr marL="0" marR="0" lvl="0" indent="0" algn="l" defTabSz="914400" rtl="0" eaLnBrk="1" fontAlgn="auto" latinLnBrk="0" hangingPunct="1">
+                        <a:lnSpc>
+                          <a:spcPct val="100000"/>
+                        </a:lnSpc>
+                        <a:spcBef>
+                          <a:spcPts val="0"/>
+                        </a:spcBef>
+                        <a:spcAft>
+                          <a:spcPts val="0"/>
+                        </a:spcAft>
+                        <a:buClrTx/>
+                        <a:buSzTx/>
+                        <a:buFontTx/>
+                        <a:buNone/>
+                        <a:tabLst/>
+                        <a:defRPr/>
+                      </a:pPr>
+                      <a:endParaRPr kumimoji="0" lang="en-US" sz="1800" b="0" i="0" u="none" strike="noStrike" kern="1200" cap="none" spc="0" normalizeH="0" baseline="0" noProof="0">
+                        <a:ln>
+                          <a:noFill/>
+                        </a:ln>
+                        <a:solidFill>
+                          <a:prstClr val="black"/>
+                        </a:solidFill>
+                        <a:effectLst/>
+                        <a:uLnTx/>
+                        <a:uFillTx/>
+                        <a:latin typeface="Aptos" panose="02110004020202020204"/>
+                        <a:ea typeface="+mn-ea"/>
+                        <a:cs typeface="+mn-cs"/>
+                      </a:endParaRPr>
+                    </a:p>
+                  </a:txBody>
+                  <a:tcPr/>
+                </a:tc>
+                <a:tc>
+                  <a:txBody>
+                    <a:bodyPr/>
+                    <a:lstStyle/>
+                    <a:p>
+                      <a:endParaRPr lang="en-US"/>
+                    </a:p>
+                  </a:txBody>
+                  <a:tcPr/>
+                </a:tc>
+                <a:tc>
+                  <a:txBody>
+                    <a:bodyPr/>
+                    <a:lstStyle/>
+                    <a:p>
+                      <a:endParaRPr lang="en-US"/>
+                    </a:p>
+                  </a:txBody>
+                  <a:tcPr/>
+                </a:tc>
+                <a:extLst>
+                  <a:ext uri="{0D108BD9-81ED-4DB2-BD59-A6C34878D82A}">
+                    <a16:rowId xmlns:a16="http://schemas.microsoft.com/office/drawing/2014/main" val="321010593"/>
+                  </a:ext>
+                </a:extLst>
+              </a:tr>
+              <a:tr h="370840">
+                <a:tc>
+                  <a:txBody>
+                    <a:bodyPr/>
+                    <a:lstStyle/>
+                    <a:p>
+                      <a:r>
+                        <a:rPr lang="en-US"/>
+                        <a:t>5</a:t>
+                      </a:r>
+                    </a:p>
+                  </a:txBody>
+                  <a:tcPr/>
+                </a:tc>
+                <a:tc>
+                  <a:txBody>
+                    <a:bodyPr/>
+                    <a:lstStyle/>
+                    <a:p>
+                      <a:pPr marL="0" marR="0" lvl="0" indent="0" algn="l" defTabSz="914400" rtl="0" eaLnBrk="1" fontAlgn="auto" latinLnBrk="0" hangingPunct="1">
+                        <a:lnSpc>
+                          <a:spcPct val="100000"/>
+                        </a:lnSpc>
+                        <a:spcBef>
+                          <a:spcPts val="0"/>
+                        </a:spcBef>
+                        <a:spcAft>
+                          <a:spcPts val="0"/>
+                        </a:spcAft>
+                        <a:buClrTx/>
+                        <a:buSzTx/>
+                        <a:buFontTx/>
+                        <a:buNone/>
+                        <a:tabLst/>
+                        <a:defRPr/>
+                      </a:pPr>
+                      <a:endParaRPr kumimoji="0" lang="en-US" sz="1800" b="0" i="0" u="none" strike="noStrike" kern="1200" cap="none" spc="0" normalizeH="0" baseline="0" noProof="0">
+                        <a:ln>
+                          <a:noFill/>
+                        </a:ln>
+                        <a:solidFill>
+                          <a:prstClr val="black"/>
+                        </a:solidFill>
+                        <a:effectLst/>
+                        <a:uLnTx/>
+                        <a:uFillTx/>
+                        <a:latin typeface="Aptos" panose="02110004020202020204"/>
+                        <a:ea typeface="+mn-ea"/>
+                        <a:cs typeface="+mn-cs"/>
+                      </a:endParaRPr>
+                    </a:p>
+                  </a:txBody>
+                  <a:tcPr/>
+                </a:tc>
+                <a:tc>
+                  <a:txBody>
+                    <a:bodyPr/>
+                    <a:lstStyle/>
+                    <a:p>
+                      <a:endParaRPr lang="en-US"/>
+                    </a:p>
+                  </a:txBody>
+                  <a:tcPr/>
+                </a:tc>
+                <a:tc>
+                  <a:txBody>
+                    <a:bodyPr/>
+                    <a:lstStyle/>
+                    <a:p>
+                      <a:endParaRPr lang="en-US"/>
+                    </a:p>
+                  </a:txBody>
+                  <a:tcPr/>
+                </a:tc>
+                <a:extLst>
+                  <a:ext uri="{0D108BD9-81ED-4DB2-BD59-A6C34878D82A}">
+                    <a16:rowId xmlns:a16="http://schemas.microsoft.com/office/drawing/2014/main" val="4153626128"/>
+                  </a:ext>
+                </a:extLst>
+              </a:tr>
+              <a:tr h="370840">
+                <a:tc>
+                  <a:txBody>
+                    <a:bodyPr/>
+                    <a:lstStyle/>
+                    <a:p>
+                      <a:r>
+                        <a:rPr lang="en-US"/>
+                        <a:t>6</a:t>
+                      </a:r>
+                    </a:p>
+                  </a:txBody>
+                  <a:tcPr/>
+                </a:tc>
+                <a:tc>
+                  <a:txBody>
+                    <a:bodyPr/>
+                    <a:lstStyle/>
+                    <a:p>
+                      <a:pPr marL="0" marR="0" lvl="0" indent="0" algn="l" defTabSz="914400" rtl="0" eaLnBrk="1" fontAlgn="auto" latinLnBrk="0" hangingPunct="1">
+                        <a:lnSpc>
+                          <a:spcPct val="100000"/>
+                        </a:lnSpc>
+                        <a:spcBef>
+                          <a:spcPts val="0"/>
+                        </a:spcBef>
+                        <a:spcAft>
+                          <a:spcPts val="0"/>
+                        </a:spcAft>
+                        <a:buClrTx/>
+                        <a:buSzTx/>
+                        <a:buFontTx/>
+                        <a:buNone/>
+                        <a:tabLst/>
+                        <a:defRPr/>
+                      </a:pPr>
+                      <a:endParaRPr kumimoji="0" lang="en-US" sz="1800" b="0" i="0" u="none" strike="noStrike" kern="1200" cap="none" spc="0" normalizeH="0" baseline="0" noProof="0">
+                        <a:ln>
+                          <a:noFill/>
+                        </a:ln>
+                        <a:solidFill>
+                          <a:prstClr val="black"/>
+                        </a:solidFill>
+                        <a:effectLst/>
+                        <a:uLnTx/>
+                        <a:uFillTx/>
+                        <a:latin typeface="Aptos" panose="02110004020202020204"/>
+                        <a:ea typeface="+mn-ea"/>
+                        <a:cs typeface="+mn-cs"/>
+                      </a:endParaRPr>
+                    </a:p>
+                  </a:txBody>
+                  <a:tcPr/>
+                </a:tc>
+                <a:tc>
+                  <a:txBody>
+                    <a:bodyPr/>
+                    <a:lstStyle/>
+                    <a:p>
+                      <a:endParaRPr lang="en-US"/>
+                    </a:p>
+                  </a:txBody>
+                  <a:tcPr/>
+                </a:tc>
+                <a:tc>
+                  <a:txBody>
+                    <a:bodyPr/>
+                    <a:lstStyle/>
+                    <a:p>
+                      <a:endParaRPr lang="en-US"/>
+                    </a:p>
+                  </a:txBody>
+                  <a:tcPr/>
+                </a:tc>
+                <a:extLst>
+                  <a:ext uri="{0D108BD9-81ED-4DB2-BD59-A6C34878D82A}">
+                    <a16:rowId xmlns:a16="http://schemas.microsoft.com/office/drawing/2014/main" val="367107915"/>
+                  </a:ext>
+                </a:extLst>
+              </a:tr>
+              <a:tr h="370840">
+                <a:tc>
+                  <a:txBody>
+                    <a:bodyPr/>
+                    <a:lstStyle/>
+                    <a:p>
+                      <a:r>
+                        <a:rPr lang="en-US"/>
+                        <a:t>7</a:t>
+                      </a:r>
+                    </a:p>
+                  </a:txBody>
+                  <a:tcPr/>
+                </a:tc>
+                <a:tc>
+                  <a:txBody>
+                    <a:bodyPr/>
+                    <a:lstStyle/>
+                    <a:p>
+                      <a:pPr marL="0" marR="0" lvl="0" indent="0" algn="l" defTabSz="914400" rtl="0" eaLnBrk="1" fontAlgn="auto" latinLnBrk="0" hangingPunct="1">
+                        <a:lnSpc>
+                          <a:spcPct val="100000"/>
+                        </a:lnSpc>
+                        <a:spcBef>
+                          <a:spcPts val="0"/>
+                        </a:spcBef>
+                        <a:spcAft>
+                          <a:spcPts val="0"/>
+                        </a:spcAft>
+                        <a:buClrTx/>
+                        <a:buSzTx/>
+                        <a:buFontTx/>
+                        <a:buNone/>
+                        <a:tabLst/>
+                        <a:defRPr/>
+                      </a:pPr>
+                      <a:endParaRPr kumimoji="0" lang="en-US" sz="1800" b="0" i="0" u="none" strike="noStrike" kern="1200" cap="none" spc="0" normalizeH="0" baseline="0" noProof="0">
+                        <a:ln>
+                          <a:noFill/>
+                        </a:ln>
+                        <a:solidFill>
+                          <a:prstClr val="black"/>
+                        </a:solidFill>
+                        <a:effectLst/>
+                        <a:uLnTx/>
+                        <a:uFillTx/>
+                        <a:latin typeface="Aptos" panose="02110004020202020204"/>
+                        <a:ea typeface="+mn-ea"/>
+                        <a:cs typeface="+mn-cs"/>
+                      </a:endParaRPr>
+                    </a:p>
+                  </a:txBody>
+                  <a:tcPr/>
+                </a:tc>
+                <a:tc>
+                  <a:txBody>
+                    <a:bodyPr/>
+                    <a:lstStyle/>
+                    <a:p>
+                      <a:endParaRPr lang="en-US"/>
+                    </a:p>
+                  </a:txBody>
+                  <a:tcPr/>
+                </a:tc>
+                <a:tc>
+                  <a:txBody>
+                    <a:bodyPr/>
+                    <a:lstStyle/>
+                    <a:p>
+                      <a:endParaRPr lang="en-US"/>
+                    </a:p>
+                  </a:txBody>
+                  <a:tcPr/>
+                </a:tc>
+                <a:extLst>
+                  <a:ext uri="{0D108BD9-81ED-4DB2-BD59-A6C34878D82A}">
+                    <a16:rowId xmlns:a16="http://schemas.microsoft.com/office/drawing/2014/main" val="1947633682"/>
+                  </a:ext>
+                </a:extLst>
+              </a:tr>
+              <a:tr h="370840">
+                <a:tc>
+                  <a:txBody>
+                    <a:bodyPr/>
+                    <a:lstStyle/>
+                    <a:p>
+                      <a:r>
+                        <a:rPr lang="en-US"/>
+                        <a:t>8</a:t>
+                      </a:r>
+                    </a:p>
+                  </a:txBody>
+                  <a:tcPr/>
+                </a:tc>
+                <a:tc>
+                  <a:txBody>
+                    <a:bodyPr/>
+                    <a:lstStyle/>
+                    <a:p>
+                      <a:pPr marL="0" marR="0" lvl="0" indent="0" algn="l" defTabSz="914400" rtl="0" eaLnBrk="1" fontAlgn="auto" latinLnBrk="0" hangingPunct="1">
+                        <a:lnSpc>
+                          <a:spcPct val="100000"/>
+                        </a:lnSpc>
+                        <a:spcBef>
+                          <a:spcPts val="0"/>
+                        </a:spcBef>
+                        <a:spcAft>
+                          <a:spcPts val="0"/>
+                        </a:spcAft>
+                        <a:buClrTx/>
+                        <a:buSzTx/>
+                        <a:buFontTx/>
+                        <a:buNone/>
+                        <a:tabLst/>
+                        <a:defRPr/>
+                      </a:pPr>
+                      <a:endParaRPr kumimoji="0" lang="en-US" sz="1800" b="0" i="0" u="none" strike="noStrike" kern="1200" cap="none" spc="0" normalizeH="0" baseline="0" noProof="0">
+                        <a:ln>
+                          <a:noFill/>
+                        </a:ln>
+                        <a:solidFill>
+                          <a:prstClr val="black"/>
+                        </a:solidFill>
+                        <a:effectLst/>
+                        <a:uLnTx/>
+                        <a:uFillTx/>
+                        <a:latin typeface="Aptos" panose="02110004020202020204"/>
+                        <a:ea typeface="+mn-ea"/>
+                        <a:cs typeface="+mn-cs"/>
+                      </a:endParaRPr>
+                    </a:p>
+                  </a:txBody>
+                  <a:tcPr/>
+                </a:tc>
+                <a:tc>
+                  <a:txBody>
+                    <a:bodyPr/>
+                    <a:lstStyle/>
+                    <a:p>
+                      <a:endParaRPr lang="en-US"/>
+                    </a:p>
+                  </a:txBody>
+                  <a:tcPr/>
+                </a:tc>
+                <a:tc>
+                  <a:txBody>
+                    <a:bodyPr/>
+                    <a:lstStyle/>
+                    <a:p>
+                      <a:endParaRPr lang="en-US"/>
+                    </a:p>
+                  </a:txBody>
+                  <a:tcPr/>
+                </a:tc>
+                <a:extLst>
+                  <a:ext uri="{0D108BD9-81ED-4DB2-BD59-A6C34878D82A}">
+                    <a16:rowId xmlns:a16="http://schemas.microsoft.com/office/drawing/2014/main" val="1066600853"/>
+                  </a:ext>
+                </a:extLst>
+              </a:tr>
+              <a:tr h="370840">
+                <a:tc>
+                  <a:txBody>
+                    <a:bodyPr/>
+                    <a:lstStyle/>
+                    <a:p>
+                      <a:r>
+                        <a:rPr lang="en-US"/>
+                        <a:t>9</a:t>
+                      </a:r>
+                    </a:p>
+                  </a:txBody>
+                  <a:tcPr/>
+                </a:tc>
+                <a:tc>
+                  <a:txBody>
+                    <a:bodyPr/>
+                    <a:lstStyle/>
+                    <a:p>
+                      <a:pPr marL="0" marR="0" lvl="0" indent="0" algn="l" defTabSz="914400" rtl="0" eaLnBrk="1" fontAlgn="auto" latinLnBrk="0" hangingPunct="1">
+                        <a:lnSpc>
+                          <a:spcPct val="100000"/>
+                        </a:lnSpc>
+                        <a:spcBef>
+                          <a:spcPts val="0"/>
+                        </a:spcBef>
+                        <a:spcAft>
+                          <a:spcPts val="0"/>
+                        </a:spcAft>
+                        <a:buClrTx/>
+                        <a:buSzTx/>
+                        <a:buFontTx/>
+                        <a:buNone/>
+                        <a:tabLst/>
+                        <a:defRPr/>
+                      </a:pPr>
+                      <a:endParaRPr kumimoji="0" lang="en-US" sz="1800" b="0" i="0" u="none" strike="noStrike" kern="1200" cap="none" spc="0" normalizeH="0" baseline="0" noProof="0">
+                        <a:ln>
+                          <a:noFill/>
+                        </a:ln>
+                        <a:solidFill>
+                          <a:prstClr val="black"/>
+                        </a:solidFill>
+                        <a:effectLst/>
+                        <a:uLnTx/>
+                        <a:uFillTx/>
+                        <a:latin typeface="Aptos" panose="02110004020202020204"/>
+                        <a:ea typeface="+mn-ea"/>
+                        <a:cs typeface="+mn-cs"/>
+                      </a:endParaRPr>
+                    </a:p>
+                  </a:txBody>
+                  <a:tcPr/>
+                </a:tc>
+                <a:tc>
+                  <a:txBody>
+                    <a:bodyPr/>
+                    <a:lstStyle/>
+                    <a:p>
+                      <a:endParaRPr lang="en-US"/>
+                    </a:p>
+                  </a:txBody>
+                  <a:tcPr/>
+                </a:tc>
+                <a:tc>
+                  <a:txBody>
+                    <a:bodyPr/>
+                    <a:lstStyle/>
+                    <a:p>
+                      <a:endParaRPr lang="en-US"/>
+                    </a:p>
+                  </a:txBody>
+                  <a:tcPr/>
+                </a:tc>
+                <a:extLst>
+                  <a:ext uri="{0D108BD9-81ED-4DB2-BD59-A6C34878D82A}">
+                    <a16:rowId xmlns:a16="http://schemas.microsoft.com/office/drawing/2014/main" val="204814704"/>
+                  </a:ext>
+                </a:extLst>
+              </a:tr>
+              <a:tr h="370840">
+                <a:tc>
+                  <a:txBody>
+                    <a:bodyPr/>
+                    <a:lstStyle/>
+                    <a:p>
+                      <a:r>
+                        <a:rPr lang="en-US"/>
+                        <a:t>10</a:t>
+                      </a:r>
+                    </a:p>
+                  </a:txBody>
+                  <a:tcPr/>
+                </a:tc>
+                <a:tc>
+                  <a:txBody>
+                    <a:bodyPr/>
+                    <a:lstStyle/>
+                    <a:p>
+                      <a:pPr marL="0" marR="0" lvl="0" indent="0" algn="l" defTabSz="914400" rtl="0" eaLnBrk="1" fontAlgn="auto" latinLnBrk="0" hangingPunct="1">
+                        <a:lnSpc>
+                          <a:spcPct val="100000"/>
+                        </a:lnSpc>
+                        <a:spcBef>
+                          <a:spcPts val="0"/>
+                        </a:spcBef>
+                        <a:spcAft>
+                          <a:spcPts val="0"/>
+                        </a:spcAft>
+                        <a:buClrTx/>
+                        <a:buSzTx/>
+                        <a:buFontTx/>
+                        <a:buNone/>
+                        <a:tabLst/>
+                        <a:defRPr/>
+                      </a:pPr>
+                      <a:endParaRPr kumimoji="0" lang="en-US" sz="1800" b="0" i="0" u="none" strike="noStrike" kern="1200" cap="none" spc="0" normalizeH="0" baseline="0" noProof="0">
+                        <a:ln>
+                          <a:noFill/>
+                        </a:ln>
+                        <a:solidFill>
+                          <a:prstClr val="black"/>
+                        </a:solidFill>
+                        <a:effectLst/>
+                        <a:uLnTx/>
+                        <a:uFillTx/>
+                        <a:latin typeface="Aptos" panose="02110004020202020204"/>
+                        <a:ea typeface="+mn-ea"/>
+                        <a:cs typeface="+mn-cs"/>
+                      </a:endParaRPr>
+                    </a:p>
+                  </a:txBody>
+                  <a:tcPr/>
+                </a:tc>
+                <a:tc>
+                  <a:txBody>
+                    <a:bodyPr/>
+                    <a:lstStyle/>
+                    <a:p>
+                      <a:endParaRPr lang="en-US"/>
+                    </a:p>
+                  </a:txBody>
+                  <a:tcPr/>
+                </a:tc>
+                <a:tc>
+                  <a:txBody>
+                    <a:bodyPr/>
+                    <a:lstStyle/>
+                    <a:p>
+                      <a:endParaRPr lang="en-US"/>
+                    </a:p>
+                  </a:txBody>
+                  <a:tcPr/>
+                </a:tc>
+                <a:extLst>
+                  <a:ext uri="{0D108BD9-81ED-4DB2-BD59-A6C34878D82A}">
+                    <a16:rowId xmlns:a16="http://schemas.microsoft.com/office/drawing/2014/main" val="3786010964"/>
+                  </a:ext>
+                </a:extLst>
+              </a:tr>
+              <a:tr h="370840">
+                <a:tc>
+                  <a:txBody>
+                    <a:bodyPr/>
+                    <a:lstStyle/>
+                    <a:p>
+                      <a:r>
+                        <a:rPr lang="en-US"/>
+                        <a:t>11</a:t>
+                      </a:r>
+                    </a:p>
+                  </a:txBody>
+                  <a:tcPr/>
+                </a:tc>
+                <a:tc>
+                  <a:txBody>
+                    <a:bodyPr/>
+                    <a:lstStyle/>
+                    <a:p>
+                      <a:pPr marL="0" marR="0" lvl="0" indent="0" algn="l" defTabSz="914400" rtl="0" eaLnBrk="1" fontAlgn="auto" latinLnBrk="0" hangingPunct="1">
+                        <a:lnSpc>
+                          <a:spcPct val="100000"/>
+                        </a:lnSpc>
+                        <a:spcBef>
+                          <a:spcPts val="0"/>
+                        </a:spcBef>
+                        <a:spcAft>
+                          <a:spcPts val="0"/>
+                        </a:spcAft>
+                        <a:buClrTx/>
+                        <a:buSzTx/>
+                        <a:buFontTx/>
+                        <a:buNone/>
+                        <a:tabLst/>
+                        <a:defRPr/>
+                      </a:pPr>
+                      <a:endParaRPr kumimoji="0" lang="en-US" sz="1800" b="0" i="0" u="none" strike="noStrike" kern="1200" cap="none" spc="0" normalizeH="0" baseline="0" noProof="0">
+                        <a:ln>
+                          <a:noFill/>
+                        </a:ln>
+                        <a:solidFill>
+                          <a:prstClr val="black"/>
+                        </a:solidFill>
+                        <a:effectLst/>
+                        <a:uLnTx/>
+                        <a:uFillTx/>
+                        <a:latin typeface="Aptos" panose="02110004020202020204"/>
+                        <a:ea typeface="+mn-ea"/>
+                        <a:cs typeface="+mn-cs"/>
+                      </a:endParaRPr>
+                    </a:p>
+                  </a:txBody>
+                  <a:tcPr/>
+                </a:tc>
+                <a:tc>
+                  <a:txBody>
+                    <a:bodyPr/>
+                    <a:lstStyle/>
+                    <a:p>
+                      <a:endParaRPr lang="en-US"/>
+                    </a:p>
+                  </a:txBody>
+                  <a:tcPr/>
+                </a:tc>
+                <a:tc>
+                  <a:txBody>
+                    <a:bodyPr/>
+                    <a:lstStyle/>
+                    <a:p>
+                      <a:endParaRPr lang="en-US"/>
+                    </a:p>
+                  </a:txBody>
+                  <a:tcPr/>
+                </a:tc>
+                <a:extLst>
+                  <a:ext uri="{0D108BD9-81ED-4DB2-BD59-A6C34878D82A}">
+                    <a16:rowId xmlns:a16="http://schemas.microsoft.com/office/drawing/2014/main" val="1425725463"/>
+                  </a:ext>
+                </a:extLst>
+              </a:tr>
+              <a:tr h="370840">
+                <a:tc>
+                  <a:txBody>
+                    <a:bodyPr/>
+                    <a:lstStyle/>
+                    <a:p>
+                      <a:r>
+                        <a:rPr lang="en-US"/>
+                        <a:t>12</a:t>
+                      </a:r>
+                    </a:p>
+                  </a:txBody>
+                  <a:tcPr/>
+                </a:tc>
+                <a:tc>
+                  <a:txBody>
+                    <a:bodyPr/>
+                    <a:lstStyle/>
+                    <a:p>
+                      <a:pPr marL="0" marR="0" lvl="0" indent="0" algn="l" defTabSz="914400" rtl="0" eaLnBrk="1" fontAlgn="auto" latinLnBrk="0" hangingPunct="1">
+                        <a:lnSpc>
+                          <a:spcPct val="100000"/>
+                        </a:lnSpc>
+                        <a:spcBef>
+                          <a:spcPts val="0"/>
+                        </a:spcBef>
+                        <a:spcAft>
+                          <a:spcPts val="0"/>
+                        </a:spcAft>
+                        <a:buClrTx/>
+                        <a:buSzTx/>
+                        <a:buFontTx/>
+                        <a:buNone/>
+                        <a:tabLst/>
+                        <a:defRPr/>
+                      </a:pPr>
+                      <a:endParaRPr kumimoji="0" lang="en-US" sz="1800" b="0" i="0" u="none" strike="noStrike" kern="1200" cap="none" spc="0" normalizeH="0" baseline="0" noProof="0">
+                        <a:ln>
+                          <a:noFill/>
+                        </a:ln>
+                        <a:solidFill>
+                          <a:prstClr val="black"/>
+                        </a:solidFill>
+                        <a:effectLst/>
+                        <a:uLnTx/>
+                        <a:uFillTx/>
+                        <a:latin typeface="Aptos" panose="02110004020202020204"/>
+                        <a:ea typeface="+mn-ea"/>
+                        <a:cs typeface="+mn-cs"/>
+                      </a:endParaRPr>
+                    </a:p>
+                  </a:txBody>
+                  <a:tcPr/>
+                </a:tc>
+                <a:tc>
+                  <a:txBody>
+                    <a:bodyPr/>
+                    <a:lstStyle/>
+                    <a:p>
+                      <a:endParaRPr lang="en-US"/>
+                    </a:p>
+                  </a:txBody>
+                  <a:tcPr/>
+                </a:tc>
+                <a:tc>
+                  <a:txBody>
+                    <a:bodyPr/>
+                    <a:lstStyle/>
+                    <a:p>
+                      <a:endParaRPr lang="en-US"/>
+                    </a:p>
+                  </a:txBody>
+                  <a:tcPr/>
+                </a:tc>
+                <a:extLst>
+                  <a:ext uri="{0D108BD9-81ED-4DB2-BD59-A6C34878D82A}">
+                    <a16:rowId xmlns:a16="http://schemas.microsoft.com/office/drawing/2014/main" val="1225789841"/>
+                  </a:ext>
+                </a:extLst>
+              </a:tr>
+              <a:tr h="370840">
+                <a:tc>
+                  <a:txBody>
+                    <a:bodyPr/>
+                    <a:lstStyle/>
+                    <a:p>
+                      <a:r>
+                        <a:rPr lang="en-US"/>
+                        <a:t>13</a:t>
+                      </a:r>
+                    </a:p>
+                  </a:txBody>
+                  <a:tcPr/>
+                </a:tc>
+                <a:tc>
+                  <a:txBody>
+                    <a:bodyPr/>
+                    <a:lstStyle/>
+                    <a:p>
+                      <a:pPr marL="0" marR="0" lvl="0" indent="0" algn="l" defTabSz="914400" rtl="0" eaLnBrk="1" fontAlgn="auto" latinLnBrk="0" hangingPunct="1">
+                        <a:lnSpc>
+                          <a:spcPct val="100000"/>
+                        </a:lnSpc>
+                        <a:spcBef>
+                          <a:spcPts val="0"/>
+                        </a:spcBef>
+                        <a:spcAft>
+                          <a:spcPts val="0"/>
+                        </a:spcAft>
+                        <a:buClrTx/>
+                        <a:buSzTx/>
+                        <a:buFontTx/>
+                        <a:buNone/>
+                        <a:tabLst/>
+                        <a:defRPr/>
+                      </a:pPr>
+                      <a:endParaRPr kumimoji="0" lang="en-US" sz="1800" b="0" i="0" u="none" strike="noStrike" kern="1200" cap="none" spc="0" normalizeH="0" baseline="0" noProof="0" dirty="0">
+                        <a:ln>
+                          <a:noFill/>
+                        </a:ln>
+                        <a:solidFill>
+                          <a:prstClr val="black"/>
+                        </a:solidFill>
+                        <a:effectLst/>
+                        <a:uLnTx/>
+                        <a:uFillTx/>
+                        <a:latin typeface="Aptos" panose="02110004020202020204"/>
+                        <a:ea typeface="+mn-ea"/>
+                        <a:cs typeface="+mn-cs"/>
+                      </a:endParaRPr>
+                    </a:p>
+                  </a:txBody>
+                  <a:tcPr/>
+                </a:tc>
+                <a:tc>
+                  <a:txBody>
+                    <a:bodyPr/>
+                    <a:lstStyle/>
+                    <a:p>
+                      <a:endParaRPr lang="en-US" dirty="0"/>
+                    </a:p>
+                  </a:txBody>
+                  <a:tcPr/>
+                </a:tc>
+                <a:tc>
+                  <a:txBody>
+                    <a:bodyPr/>
+                    <a:lstStyle/>
+                    <a:p>
+                      <a:endParaRPr lang="en-US" dirty="0"/>
+                    </a:p>
+                  </a:txBody>
+                  <a:tcPr/>
+                </a:tc>
+                <a:extLst>
+                  <a:ext uri="{0D108BD9-81ED-4DB2-BD59-A6C34878D82A}">
+                    <a16:rowId xmlns:a16="http://schemas.microsoft.com/office/drawing/2014/main" val="2776844142"/>
+                  </a:ext>
+                </a:extLst>
+              </a:tr>
+            </a:tbl>
+          </a:graphicData>
+        </a:graphic>
+      </p:graphicFrame>
+    </p:spTree>
+    <p:extLst>
+      <p:ext uri="{BB962C8B-B14F-4D97-AF65-F5344CB8AC3E}">
+        <p14:creationId xmlns:p14="http://schemas.microsoft.com/office/powerpoint/2010/main" val="2132348827"/>
       </p:ext>
     </p:extLst>
   </p:cSld>
@@ -8729,6 +9770,28 @@
 </file>
 
 <file path=customXml/item1.xml><?xml version="1.0" encoding="utf-8"?>
+<p:properties xmlns:p="http://schemas.microsoft.com/office/2006/metadata/properties" xmlns:xsi="http://www.w3.org/2001/XMLSchema-instance" xmlns:pc="http://schemas.microsoft.com/office/infopath/2007/PartnerControls">
+  <documentManagement>
+    <_ip_UnifiedCompliancePolicyUIAction xmlns="http://schemas.microsoft.com/sharepoint/v3" xsi:nil="true"/>
+    <_ip_UnifiedCompliancePolicyProperties xmlns="http://schemas.microsoft.com/sharepoint/v3" xsi:nil="true"/>
+    <lcf76f155ced4ddcb4097134ff3c332f xmlns="842c4d38-db0b-488e-8158-e129c7d2172c">
+      <Terms xmlns="http://schemas.microsoft.com/office/infopath/2007/PartnerControls"/>
+    </lcf76f155ced4ddcb4097134ff3c332f>
+    <TaxCatchAll xmlns="230e9df3-be65-4c73-a93b-d1236ebd677e" xsi:nil="true"/>
+  </documentManagement>
+</p:properties>
+</file>
+
+<file path=customXml/item2.xml><?xml version="1.0" encoding="utf-8"?>
+<?mso-contentType ?>
+<FormTemplates xmlns="http://schemas.microsoft.com/sharepoint/v3/contenttype/forms">
+  <Display>DocumentLibraryForm</Display>
+  <Edit>DocumentLibraryForm</Edit>
+  <New>DocumentLibraryForm</New>
+</FormTemplates>
+</file>
+
+<file path=customXml/item3.xml><?xml version="1.0" encoding="utf-8"?>
 <ct:contentTypeSchema xmlns:ct="http://schemas.microsoft.com/office/2006/metadata/contentType" xmlns:ma="http://schemas.microsoft.com/office/2006/metadata/properties/metaAttributes" ct:_="" ma:_="" ma:contentTypeName="Document" ma:contentTypeID="0x0101004D2262D69CE50D409DFF9EBF2CEE9494" ma:contentTypeVersion="18" ma:contentTypeDescription="Create a new document." ma:contentTypeScope="" ma:versionID="3ffcd8868017f0cf01ddc2442c8493b7">
   <xsd:schema xmlns:xsd="http://www.w3.org/2001/XMLSchema" xmlns:xs="http://www.w3.org/2001/XMLSchema" xmlns:p="http://schemas.microsoft.com/office/2006/metadata/properties" xmlns:ns1="http://schemas.microsoft.com/sharepoint/v3" xmlns:ns2="aeb6dcb5-4f16-42bb-af32-2fc119f95623" xmlns:ns3="842c4d38-db0b-488e-8158-e129c7d2172c" xmlns:ns4="230e9df3-be65-4c73-a93b-d1236ebd677e" targetNamespace="http://schemas.microsoft.com/office/2006/metadata/properties" ma:root="true" ma:fieldsID="f26b5ba735f82def1f158b6ee6de3bfe" ns1:_="" ns2:_="" ns3:_="" ns4:_="">
     <xsd:import namespace="http://schemas.microsoft.com/sharepoint/v3"/>
@@ -8987,29 +10050,34 @@
 </ct:contentTypeSchema>
 </file>
 
-<file path=customXml/item2.xml><?xml version="1.0" encoding="utf-8"?>
-<?mso-contentType ?>
-<FormTemplates xmlns="http://schemas.microsoft.com/sharepoint/v3/contenttype/forms">
-  <Display>DocumentLibraryForm</Display>
-  <Edit>DocumentLibraryForm</Edit>
-  <New>DocumentLibraryForm</New>
-</FormTemplates>
+<file path=customXml/itemProps1.xml><?xml version="1.0" encoding="utf-8"?>
+<ds:datastoreItem xmlns:ds="http://schemas.openxmlformats.org/officeDocument/2006/customXml" ds:itemID="{252B41B1-2075-477A-BEFD-E387646BE1B0}">
+  <ds:schemaRefs>
+    <ds:schemaRef ds:uri="http://www.w3.org/XML/1998/namespace"/>
+    <ds:schemaRef ds:uri="http://schemas.openxmlformats.org/package/2006/metadata/core-properties"/>
+    <ds:schemaRef ds:uri="http://purl.org/dc/elements/1.1/"/>
+    <ds:schemaRef ds:uri="842c4d38-db0b-488e-8158-e129c7d2172c"/>
+    <ds:schemaRef ds:uri="http://schemas.microsoft.com/office/2006/documentManagement/types"/>
+    <ds:schemaRef ds:uri="http://schemas.microsoft.com/office/2006/metadata/properties"/>
+    <ds:schemaRef ds:uri="http://schemas.microsoft.com/sharepoint/v3"/>
+    <ds:schemaRef ds:uri="http://purl.org/dc/dcmitype/"/>
+    <ds:schemaRef ds:uri="http://schemas.microsoft.com/office/infopath/2007/PartnerControls"/>
+    <ds:schemaRef ds:uri="230e9df3-be65-4c73-a93b-d1236ebd677e"/>
+    <ds:schemaRef ds:uri="aeb6dcb5-4f16-42bb-af32-2fc119f95623"/>
+    <ds:schemaRef ds:uri="http://purl.org/dc/terms/"/>
+  </ds:schemaRefs>
+</ds:datastoreItem>
 </file>
 
-<file path=customXml/item3.xml><?xml version="1.0" encoding="utf-8"?>
-<p:properties xmlns:p="http://schemas.microsoft.com/office/2006/metadata/properties" xmlns:xsi="http://www.w3.org/2001/XMLSchema-instance" xmlns:pc="http://schemas.microsoft.com/office/infopath/2007/PartnerControls">
-  <documentManagement>
-    <_ip_UnifiedCompliancePolicyUIAction xmlns="http://schemas.microsoft.com/sharepoint/v3" xsi:nil="true"/>
-    <_ip_UnifiedCompliancePolicyProperties xmlns="http://schemas.microsoft.com/sharepoint/v3" xsi:nil="true"/>
-    <lcf76f155ced4ddcb4097134ff3c332f xmlns="842c4d38-db0b-488e-8158-e129c7d2172c">
-      <Terms xmlns="http://schemas.microsoft.com/office/infopath/2007/PartnerControls"/>
-    </lcf76f155ced4ddcb4097134ff3c332f>
-    <TaxCatchAll xmlns="230e9df3-be65-4c73-a93b-d1236ebd677e" xsi:nil="true"/>
-  </documentManagement>
-</p:properties>
+<file path=customXml/itemProps2.xml><?xml version="1.0" encoding="utf-8"?>
+<ds:datastoreItem xmlns:ds="http://schemas.openxmlformats.org/officeDocument/2006/customXml" ds:itemID="{745D43AD-CF3D-47EA-9FBD-0875EF9ACD48}">
+  <ds:schemaRefs>
+    <ds:schemaRef ds:uri="http://schemas.microsoft.com/sharepoint/v3/contenttype/forms"/>
+  </ds:schemaRefs>
+</ds:datastoreItem>
 </file>
 
-<file path=customXml/itemProps1.xml><?xml version="1.0" encoding="utf-8"?>
+<file path=customXml/itemProps3.xml><?xml version="1.0" encoding="utf-8"?>
 <ds:datastoreItem xmlns:ds="http://schemas.openxmlformats.org/officeDocument/2006/customXml" ds:itemID="{8BFF0915-A5C2-4D15-B007-68560D9AF6F4}">
   <ds:schemaRefs>
     <ds:schemaRef ds:uri="http://schemas.microsoft.com/office/2006/metadata/contentType"/>
@@ -9030,33 +10098,6 @@
 </ds:datastoreItem>
 </file>
 
-<file path=customXml/itemProps2.xml><?xml version="1.0" encoding="utf-8"?>
-<ds:datastoreItem xmlns:ds="http://schemas.openxmlformats.org/officeDocument/2006/customXml" ds:itemID="{745D43AD-CF3D-47EA-9FBD-0875EF9ACD48}">
-  <ds:schemaRefs>
-    <ds:schemaRef ds:uri="http://schemas.microsoft.com/sharepoint/v3/contenttype/forms"/>
-  </ds:schemaRefs>
-</ds:datastoreItem>
-</file>
-
-<file path=customXml/itemProps3.xml><?xml version="1.0" encoding="utf-8"?>
-<ds:datastoreItem xmlns:ds="http://schemas.openxmlformats.org/officeDocument/2006/customXml" ds:itemID="{252B41B1-2075-477A-BEFD-E387646BE1B0}">
-  <ds:schemaRefs>
-    <ds:schemaRef ds:uri="http://www.w3.org/XML/1998/namespace"/>
-    <ds:schemaRef ds:uri="http://schemas.openxmlformats.org/package/2006/metadata/core-properties"/>
-    <ds:schemaRef ds:uri="http://purl.org/dc/elements/1.1/"/>
-    <ds:schemaRef ds:uri="842c4d38-db0b-488e-8158-e129c7d2172c"/>
-    <ds:schemaRef ds:uri="http://schemas.microsoft.com/office/2006/documentManagement/types"/>
-    <ds:schemaRef ds:uri="http://schemas.microsoft.com/office/2006/metadata/properties"/>
-    <ds:schemaRef ds:uri="http://schemas.microsoft.com/sharepoint/v3"/>
-    <ds:schemaRef ds:uri="http://purl.org/dc/dcmitype/"/>
-    <ds:schemaRef ds:uri="http://schemas.microsoft.com/office/infopath/2007/PartnerControls"/>
-    <ds:schemaRef ds:uri="230e9df3-be65-4c73-a93b-d1236ebd677e"/>
-    <ds:schemaRef ds:uri="aeb6dcb5-4f16-42bb-af32-2fc119f95623"/>
-    <ds:schemaRef ds:uri="http://purl.org/dc/terms/"/>
-  </ds:schemaRefs>
-</ds:datastoreItem>
-</file>
-
 <file path=docMetadata/LabelInfo.xml><?xml version="1.0" encoding="utf-8"?>
 <clbl:labelList xmlns:clbl="http://schemas.microsoft.com/office/2020/mipLabelMetadata">
   <clbl:label id="{f42aa342-8706-4288-bd11-ebb85995028c}" enabled="1" method="Standard" siteId="{72f988bf-86f1-41af-91ab-2d7cd011db47}" removed="0"/>

</xml_diff>